<commit_message>
final notebook update for computation
</commit_message>
<xml_diff>
--- a/P4_01_presentation.pptx
+++ b/P4_01_presentation.pptx
@@ -115,6 +115,11 @@
       </a:defRPr>
     </a:lvl9pPr>
   </p:defaultTextStyle>
+  <p:extLst>
+    <p:ext uri="{EFAFB233-063F-42B5-8137-9DF3F51BA10A}">
+      <p15:sldGuideLst xmlns:p15="http://schemas.microsoft.com/office/powerpoint/2012/main"/>
+    </p:ext>
+  </p:extLst>
 </p:presentation>
 </file>
 
@@ -454,7 +459,7 @@
             <a:fld id="{5923F103-BC34-4FE4-A40E-EDDEECFDA5D0}" type="datetimeFigureOut">
               <a:rPr lang="en-US" dirty="0"/>
               <a:pPr/>
-              <a:t>4/14/2021</a:t>
+              <a:t>4/26/2021</a:t>
             </a:fld>
             <a:endParaRPr lang="en-US" dirty="0"/>
           </a:p>
@@ -1538,7 +1543,7 @@
           <a:p>
             <a:fld id="{923A1CC3-2375-41D4-9E03-427CAF2A4C1A}" type="datetimeFigureOut">
               <a:rPr lang="en-US" dirty="0"/>
-              <a:t>4/14/2021</a:t>
+              <a:t>4/26/2021</a:t>
             </a:fld>
             <a:endParaRPr lang="en-US" dirty="0"/>
           </a:p>
@@ -2514,7 +2519,7 @@
           <a:p>
             <a:fld id="{AFF16868-8199-4C2C-A5B1-63AEE139F88E}" type="datetimeFigureOut">
               <a:rPr lang="en-US" dirty="0"/>
-              <a:t>4/14/2021</a:t>
+              <a:t>4/26/2021</a:t>
             </a:fld>
             <a:endParaRPr lang="en-US" dirty="0"/>
           </a:p>
@@ -3644,7 +3649,7 @@
           <a:p>
             <a:fld id="{AAD9FF7F-6988-44CC-821B-644E70CD2F73}" type="datetimeFigureOut">
               <a:rPr lang="en-US" dirty="0"/>
-              <a:t>4/14/2021</a:t>
+              <a:t>4/26/2021</a:t>
             </a:fld>
             <a:endParaRPr lang="en-US" dirty="0"/>
           </a:p>
@@ -4673,7 +4678,7 @@
           <a:p>
             <a:fld id="{5C12C299-16B2-4475-990D-751901EACC14}" type="datetimeFigureOut">
               <a:rPr lang="en-US" dirty="0"/>
-              <a:t>4/14/2021</a:t>
+              <a:t>4/26/2021</a:t>
             </a:fld>
             <a:endParaRPr lang="en-US" dirty="0"/>
           </a:p>
@@ -5329,7 +5334,7 @@
           <a:p>
             <a:fld id="{9FE86839-B9D8-4651-8783-F325ECE74E65}" type="datetimeFigureOut">
               <a:rPr lang="en-US" dirty="0"/>
-              <a:t>4/14/2021</a:t>
+              <a:t>4/26/2021</a:t>
             </a:fld>
             <a:endParaRPr lang="en-US" dirty="0"/>
           </a:p>
@@ -6186,7 +6191,7 @@
           <a:p>
             <a:fld id="{FD484F64-32F6-45C5-931F-ADC1662401D0}" type="datetimeFigureOut">
               <a:rPr lang="en-US" dirty="0"/>
-              <a:t>4/14/2021</a:t>
+              <a:t>4/26/2021</a:t>
             </a:fld>
             <a:endParaRPr lang="en-US" dirty="0"/>
           </a:p>
@@ -6372,7 +6377,7 @@
           <a:p>
             <a:fld id="{53086D93-FCAC-47E0-A2EE-787E62CA814C}" type="datetimeFigureOut">
               <a:rPr lang="en-US" dirty="0"/>
-              <a:t>4/14/2021</a:t>
+              <a:t>4/26/2021</a:t>
             </a:fld>
             <a:endParaRPr lang="en-US" dirty="0"/>
           </a:p>
@@ -7340,7 +7345,7 @@
           <a:p>
             <a:fld id="{CDA879A6-0FD0-4734-A311-86BFCA472E6E}" type="datetimeFigureOut">
               <a:rPr lang="en-US" dirty="0"/>
-              <a:t>4/14/2021</a:t>
+              <a:t>4/26/2021</a:t>
             </a:fld>
             <a:endParaRPr lang="en-US" dirty="0"/>
           </a:p>
@@ -7547,7 +7552,7 @@
           <a:p>
             <a:fld id="{19C9CA7B-DFD4-44B5-8C60-D14B8CD1FB59}" type="datetimeFigureOut">
               <a:rPr lang="en-US" dirty="0"/>
-              <a:t>4/14/2021</a:t>
+              <a:t>4/26/2021</a:t>
             </a:fld>
             <a:endParaRPr lang="en-US" dirty="0"/>
           </a:p>
@@ -8577,7 +8582,7 @@
           <a:p>
             <a:fld id="{F34E6425-0181-43F2-84FC-787E803FD2F8}" type="datetimeFigureOut">
               <a:rPr lang="en-US" dirty="0"/>
-              <a:t>4/14/2021</a:t>
+              <a:t>4/26/2021</a:t>
             </a:fld>
             <a:endParaRPr lang="en-US" dirty="0"/>
           </a:p>
@@ -8845,7 +8850,7 @@
           <a:p>
             <a:fld id="{3BDB8791-F1B0-41E7-B7FD-A781E65C4266}" type="datetimeFigureOut">
               <a:rPr lang="en-US" dirty="0"/>
-              <a:t>4/14/2021</a:t>
+              <a:t>4/26/2021</a:t>
             </a:fld>
             <a:endParaRPr lang="en-US" dirty="0"/>
           </a:p>
@@ -9251,7 +9256,7 @@
           <a:p>
             <a:fld id="{5FDD63B2-E120-4ED8-B27B-C685F510A5FE}" type="datetimeFigureOut">
               <a:rPr lang="en-US" dirty="0"/>
-              <a:t>4/14/2021</a:t>
+              <a:t>4/26/2021</a:t>
             </a:fld>
             <a:endParaRPr lang="en-US" dirty="0"/>
           </a:p>
@@ -9374,7 +9379,7 @@
           <a:p>
             <a:fld id="{7AA18ACC-A947-437B-A130-35BD54FDF1E9}" type="datetimeFigureOut">
               <a:rPr lang="en-US" dirty="0"/>
-              <a:t>4/14/2021</a:t>
+              <a:t>4/26/2021</a:t>
             </a:fld>
             <a:endParaRPr lang="en-US" dirty="0"/>
           </a:p>
@@ -9465,7 +9470,7 @@
           <a:p>
             <a:fld id="{7C8D7E02-BCB8-4D50-A234-369438C08659}" type="datetimeFigureOut">
               <a:rPr lang="en-US" dirty="0"/>
-              <a:t>4/14/2021</a:t>
+              <a:t>4/26/2021</a:t>
             </a:fld>
             <a:endParaRPr lang="en-US" dirty="0"/>
           </a:p>
@@ -10542,7 +10547,7 @@
           <a:p>
             <a:fld id="{76E86A4C-8E40-4F87-A4F0-01A0687C5742}" type="datetimeFigureOut">
               <a:rPr lang="en-US" dirty="0"/>
-              <a:t>4/14/2021</a:t>
+              <a:t>4/26/2021</a:t>
             </a:fld>
             <a:endParaRPr lang="en-US" dirty="0"/>
           </a:p>
@@ -11646,7 +11651,7 @@
           <a:p>
             <a:fld id="{35E72C73-2D91-4E12-BA25-F0AA0C03599B}" type="datetimeFigureOut">
               <a:rPr lang="en-US" dirty="0"/>
-              <a:t>4/14/2021</a:t>
+              <a:t>4/26/2021</a:t>
             </a:fld>
             <a:endParaRPr lang="en-US" dirty="0"/>
           </a:p>
@@ -12639,7 +12644,7 @@
           <a:p>
             <a:fld id="{2BE451C3-0FF4-47C4-B829-773ADF60F88C}" type="datetimeFigureOut">
               <a:rPr lang="en-US" dirty="0"/>
-              <a:t>4/14/2021</a:t>
+              <a:t>4/26/2021</a:t>
             </a:fld>
             <a:endParaRPr lang="en-US" dirty="0"/>
           </a:p>
@@ -14156,7 +14161,7 @@
           <a:p>
             <a:r>
               <a:rPr lang="fr-FR" dirty="0"/>
-              <a:t>On retient les 5 variables les plus corrélées à la TARGET</a:t>
+              <a:t>On retient les variables les plus corrélées à la TARGET</a:t>
             </a:r>
           </a:p>
         </p:txBody>
@@ -14748,8 +14753,8 @@
         </p:nvSpPr>
         <p:spPr>
           <a:xfrm>
-            <a:off x="789194" y="2555496"/>
-            <a:ext cx="4069053" cy="3416300"/>
+            <a:off x="1619705" y="2610645"/>
+            <a:ext cx="5871664" cy="3416300"/>
           </a:xfrm>
         </p:spPr>
         <p:txBody>
@@ -14773,6 +14778,7 @@
             <a:endParaRPr lang="fr-FR" dirty="0"/>
           </a:p>
           <a:p>
+            <a:pPr lvl="1"/>
             <a:r>
               <a:rPr lang="fr-FR" dirty="0"/>
               <a:t>Revenu effectif</a:t>
@@ -14782,6 +14788,7 @@
             <a:endParaRPr lang="fr-FR" dirty="0"/>
           </a:p>
           <a:p>
+            <a:pPr lvl="1"/>
             <a:r>
               <a:rPr lang="fr-FR" dirty="0"/>
               <a:t>Ratio crédit / revenus</a:t>
@@ -14791,6 +14798,7 @@
             <a:endParaRPr lang="fr-FR" dirty="0"/>
           </a:p>
           <a:p>
+            <a:pPr lvl="1"/>
             <a:r>
               <a:rPr lang="fr-FR" dirty="0"/>
               <a:t>Durée de remboursement</a:t>
@@ -14800,316 +14808,14 @@
             <a:endParaRPr lang="fr-FR" dirty="0"/>
           </a:p>
           <a:p>
+            <a:pPr lvl="1"/>
             <a:r>
               <a:rPr lang="fr-FR" dirty="0"/>
-              <a:t>Temps travaillé après 16 ans</a:t>
+              <a:t>Ratio temps travaillé / temps vécu</a:t>
             </a:r>
           </a:p>
         </p:txBody>
       </p:sp>
-      <p:sp>
-        <p:nvSpPr>
-          <p:cNvPr id="4" name="Espace réservé du contenu 2">
-            <a:extLst>
-              <a:ext uri="{FF2B5EF4-FFF2-40B4-BE49-F238E27FC236}">
-                <a16:creationId xmlns:a16="http://schemas.microsoft.com/office/drawing/2014/main" id="{5C83DA80-F735-422F-AAAA-A75770A66F6C}"/>
-              </a:ext>
-            </a:extLst>
-          </p:cNvPr>
-          <p:cNvSpPr txBox="1">
-            <a:spLocks/>
-          </p:cNvSpPr>
-          <p:nvPr/>
-        </p:nvSpPr>
-        <p:spPr>
-          <a:xfrm>
-            <a:off x="4917245" y="2404422"/>
-            <a:ext cx="2783592" cy="1510271"/>
-          </a:xfrm>
-          <a:prstGeom prst="rect">
-            <a:avLst/>
-          </a:prstGeom>
-        </p:spPr>
-        <p:txBody>
-          <a:bodyPr vert="horz" lIns="91440" tIns="45720" rIns="91440" bIns="45720" rtlCol="0">
-            <a:normAutofit/>
-          </a:bodyPr>
-          <a:lstStyle>
-            <a:lvl1pPr marL="342900" indent="-342900" algn="l" defTabSz="457200" rtl="0" eaLnBrk="1" latinLnBrk="0" hangingPunct="1">
-              <a:spcBef>
-                <a:spcPts val="1000"/>
-              </a:spcBef>
-              <a:spcAft>
-                <a:spcPts val="0"/>
-              </a:spcAft>
-              <a:buClr>
-                <a:schemeClr val="accent1"/>
-              </a:buClr>
-              <a:buSzPct val="80000"/>
-              <a:buFont typeface="Wingdings 3" charset="2"/>
-              <a:buChar char=""/>
-              <a:defRPr sz="1800" b="0" i="0" kern="1200">
-                <a:solidFill>
-                  <a:schemeClr val="tx1">
-                    <a:lumMod val="75000"/>
-                    <a:lumOff val="25000"/>
-                  </a:schemeClr>
-                </a:solidFill>
-                <a:latin typeface="+mn-lt"/>
-                <a:ea typeface="+mn-ea"/>
-                <a:cs typeface="+mn-cs"/>
-              </a:defRPr>
-            </a:lvl1pPr>
-            <a:lvl2pPr marL="742950" indent="-285750" algn="l" defTabSz="457200" rtl="0" eaLnBrk="1" latinLnBrk="0" hangingPunct="1">
-              <a:spcBef>
-                <a:spcPts val="1000"/>
-              </a:spcBef>
-              <a:spcAft>
-                <a:spcPts val="0"/>
-              </a:spcAft>
-              <a:buClr>
-                <a:schemeClr val="accent1"/>
-              </a:buClr>
-              <a:buSzPct val="80000"/>
-              <a:buFont typeface="Wingdings 3" charset="2"/>
-              <a:buChar char=""/>
-              <a:defRPr sz="1600" b="0" i="0" kern="1200">
-                <a:solidFill>
-                  <a:schemeClr val="tx1">
-                    <a:lumMod val="75000"/>
-                    <a:lumOff val="25000"/>
-                  </a:schemeClr>
-                </a:solidFill>
-                <a:latin typeface="+mn-lt"/>
-                <a:ea typeface="+mn-ea"/>
-                <a:cs typeface="+mn-cs"/>
-              </a:defRPr>
-            </a:lvl2pPr>
-            <a:lvl3pPr marL="1143000" indent="-228600" algn="l" defTabSz="457200" rtl="0" eaLnBrk="1" latinLnBrk="0" hangingPunct="1">
-              <a:spcBef>
-                <a:spcPts val="1000"/>
-              </a:spcBef>
-              <a:spcAft>
-                <a:spcPts val="0"/>
-              </a:spcAft>
-              <a:buClr>
-                <a:schemeClr val="accent1"/>
-              </a:buClr>
-              <a:buSzPct val="80000"/>
-              <a:buFont typeface="Wingdings 3" charset="2"/>
-              <a:buChar char=""/>
-              <a:defRPr sz="1400" b="0" i="0" kern="1200">
-                <a:solidFill>
-                  <a:schemeClr val="tx1">
-                    <a:lumMod val="75000"/>
-                    <a:lumOff val="25000"/>
-                  </a:schemeClr>
-                </a:solidFill>
-                <a:latin typeface="+mn-lt"/>
-                <a:ea typeface="+mn-ea"/>
-                <a:cs typeface="+mn-cs"/>
-              </a:defRPr>
-            </a:lvl3pPr>
-            <a:lvl4pPr marL="1600200" indent="-228600" algn="l" defTabSz="457200" rtl="0" eaLnBrk="1" latinLnBrk="0" hangingPunct="1">
-              <a:spcBef>
-                <a:spcPts val="1000"/>
-              </a:spcBef>
-              <a:spcAft>
-                <a:spcPts val="0"/>
-              </a:spcAft>
-              <a:buClr>
-                <a:schemeClr val="accent1"/>
-              </a:buClr>
-              <a:buSzPct val="80000"/>
-              <a:buFont typeface="Wingdings 3" charset="2"/>
-              <a:buChar char=""/>
-              <a:defRPr sz="1200" b="0" i="0" kern="1200">
-                <a:solidFill>
-                  <a:schemeClr val="tx1">
-                    <a:lumMod val="75000"/>
-                    <a:lumOff val="25000"/>
-                  </a:schemeClr>
-                </a:solidFill>
-                <a:latin typeface="+mn-lt"/>
-                <a:ea typeface="+mn-ea"/>
-                <a:cs typeface="+mn-cs"/>
-              </a:defRPr>
-            </a:lvl4pPr>
-            <a:lvl5pPr marL="2057400" indent="-228600" algn="l" defTabSz="457200" rtl="0" eaLnBrk="1" latinLnBrk="0" hangingPunct="1">
-              <a:spcBef>
-                <a:spcPts val="1000"/>
-              </a:spcBef>
-              <a:spcAft>
-                <a:spcPts val="0"/>
-              </a:spcAft>
-              <a:buClr>
-                <a:schemeClr val="accent1"/>
-              </a:buClr>
-              <a:buSzPct val="80000"/>
-              <a:buFont typeface="Wingdings 3" charset="2"/>
-              <a:buChar char=""/>
-              <a:defRPr sz="1200" b="0" i="0" kern="1200">
-                <a:solidFill>
-                  <a:schemeClr val="tx1">
-                    <a:lumMod val="75000"/>
-                    <a:lumOff val="25000"/>
-                  </a:schemeClr>
-                </a:solidFill>
-                <a:latin typeface="+mn-lt"/>
-                <a:ea typeface="+mn-ea"/>
-                <a:cs typeface="+mn-cs"/>
-              </a:defRPr>
-            </a:lvl5pPr>
-            <a:lvl6pPr marL="2514600" indent="-228600" algn="l" defTabSz="457200" rtl="0" eaLnBrk="1" latinLnBrk="0" hangingPunct="1">
-              <a:spcBef>
-                <a:spcPts val="1000"/>
-              </a:spcBef>
-              <a:spcAft>
-                <a:spcPts val="0"/>
-              </a:spcAft>
-              <a:buClr>
-                <a:schemeClr val="accent1"/>
-              </a:buClr>
-              <a:buSzPct val="80000"/>
-              <a:buFont typeface="Wingdings 3" charset="2"/>
-              <a:buChar char=""/>
-              <a:defRPr sz="1200" b="0" i="0" kern="1200">
-                <a:solidFill>
-                  <a:schemeClr val="tx1">
-                    <a:lumMod val="75000"/>
-                    <a:lumOff val="25000"/>
-                  </a:schemeClr>
-                </a:solidFill>
-                <a:latin typeface="+mn-lt"/>
-                <a:ea typeface="+mn-ea"/>
-                <a:cs typeface="+mn-cs"/>
-              </a:defRPr>
-            </a:lvl6pPr>
-            <a:lvl7pPr marL="2971800" indent="-228600" algn="l" defTabSz="457200" rtl="0" eaLnBrk="1" latinLnBrk="0" hangingPunct="1">
-              <a:spcBef>
-                <a:spcPts val="1000"/>
-              </a:spcBef>
-              <a:spcAft>
-                <a:spcPts val="0"/>
-              </a:spcAft>
-              <a:buClr>
-                <a:schemeClr val="accent1"/>
-              </a:buClr>
-              <a:buSzPct val="80000"/>
-              <a:buFont typeface="Wingdings 3" charset="2"/>
-              <a:buChar char=""/>
-              <a:defRPr sz="1200" b="0" i="0" kern="1200">
-                <a:solidFill>
-                  <a:schemeClr val="tx1">
-                    <a:lumMod val="75000"/>
-                    <a:lumOff val="25000"/>
-                  </a:schemeClr>
-                </a:solidFill>
-                <a:latin typeface="+mn-lt"/>
-                <a:ea typeface="+mn-ea"/>
-                <a:cs typeface="+mn-cs"/>
-              </a:defRPr>
-            </a:lvl7pPr>
-            <a:lvl8pPr marL="3429000" indent="-228600" algn="l" defTabSz="457200" rtl="0" eaLnBrk="1" latinLnBrk="0" hangingPunct="1">
-              <a:spcBef>
-                <a:spcPts val="1000"/>
-              </a:spcBef>
-              <a:spcAft>
-                <a:spcPts val="0"/>
-              </a:spcAft>
-              <a:buClr>
-                <a:schemeClr val="accent1"/>
-              </a:buClr>
-              <a:buSzPct val="80000"/>
-              <a:buFont typeface="Wingdings 3" charset="2"/>
-              <a:buChar char=""/>
-              <a:defRPr sz="1200" b="0" i="0" kern="1200">
-                <a:solidFill>
-                  <a:schemeClr val="tx1">
-                    <a:lumMod val="75000"/>
-                    <a:lumOff val="25000"/>
-                  </a:schemeClr>
-                </a:solidFill>
-                <a:latin typeface="+mn-lt"/>
-                <a:ea typeface="+mn-ea"/>
-                <a:cs typeface="+mn-cs"/>
-              </a:defRPr>
-            </a:lvl8pPr>
-            <a:lvl9pPr marL="3886200" indent="-228600" algn="l" defTabSz="457200" rtl="0" eaLnBrk="1" latinLnBrk="0" hangingPunct="1">
-              <a:spcBef>
-                <a:spcPts val="1000"/>
-              </a:spcBef>
-              <a:spcAft>
-                <a:spcPts val="0"/>
-              </a:spcAft>
-              <a:buClr>
-                <a:schemeClr val="accent1"/>
-              </a:buClr>
-              <a:buSzPct val="80000"/>
-              <a:buFont typeface="Wingdings 3" charset="2"/>
-              <a:buChar char=""/>
-              <a:defRPr sz="1200" b="0" i="0" kern="1200">
-                <a:solidFill>
-                  <a:schemeClr val="tx1">
-                    <a:lumMod val="75000"/>
-                    <a:lumOff val="25000"/>
-                  </a:schemeClr>
-                </a:solidFill>
-                <a:latin typeface="+mn-lt"/>
-                <a:ea typeface="+mn-ea"/>
-                <a:cs typeface="+mn-cs"/>
-              </a:defRPr>
-            </a:lvl9pPr>
-          </a:lstStyle>
-          <a:p>
-            <a:pPr marL="0" indent="0" algn="ctr">
-              <a:buFont typeface="Wingdings 3" charset="2"/>
-              <a:buNone/>
-            </a:pPr>
-            <a:r>
-              <a:rPr lang="fr-FR" dirty="0"/>
-              <a:t>Balance de la variable cible (SMOTE):</a:t>
-            </a:r>
-          </a:p>
-          <a:p>
-            <a:pPr marL="0" indent="0" algn="ctr">
-              <a:buFont typeface="Wingdings 3" charset="2"/>
-              <a:buNone/>
-            </a:pPr>
-            <a:endParaRPr lang="fr-FR" dirty="0"/>
-          </a:p>
-        </p:txBody>
-      </p:sp>
-      <p:pic>
-        <p:nvPicPr>
-          <p:cNvPr id="6" name="Image 5">
-            <a:extLst>
-              <a:ext uri="{FF2B5EF4-FFF2-40B4-BE49-F238E27FC236}">
-                <a16:creationId xmlns:a16="http://schemas.microsoft.com/office/drawing/2014/main" id="{FF852408-3554-42E7-B8ED-CC490CB57468}"/>
-              </a:ext>
-            </a:extLst>
-          </p:cNvPr>
-          <p:cNvPicPr>
-            <a:picLocks noChangeAspect="1"/>
-          </p:cNvPicPr>
-          <p:nvPr/>
-        </p:nvPicPr>
-        <p:blipFill>
-          <a:blip r:embed="rId2"/>
-          <a:stretch>
-            <a:fillRect/>
-          </a:stretch>
-        </p:blipFill>
-        <p:spPr>
-          <a:xfrm>
-            <a:off x="7193804" y="2881499"/>
-            <a:ext cx="2814003" cy="3701917"/>
-          </a:xfrm>
-          <a:prstGeom prst="rect">
-            <a:avLst/>
-          </a:prstGeom>
-        </p:spPr>
-      </p:pic>
     </p:spTree>
     <p:extLst>
       <p:ext uri="{BB962C8B-B14F-4D97-AF65-F5344CB8AC3E}">
@@ -15191,8 +14897,8 @@
         </p:nvSpPr>
         <p:spPr>
           <a:xfrm>
-            <a:off x="1190734" y="2733261"/>
-            <a:ext cx="4295665" cy="2264134"/>
+            <a:off x="1031343" y="1978218"/>
+            <a:ext cx="3490323" cy="4691029"/>
           </a:xfrm>
         </p:spPr>
         <p:txBody>
@@ -15205,21 +14911,91 @@
               <a:buNone/>
             </a:pPr>
             <a:r>
-              <a:rPr lang="fr-FR" sz="2400" dirty="0"/>
+              <a:rPr lang="fr-FR" dirty="0"/>
               <a:t>Métriques:</a:t>
             </a:r>
           </a:p>
           <a:p>
             <a:r>
-              <a:rPr lang="fr-FR" sz="2400" dirty="0"/>
+              <a:rPr lang="fr-FR" dirty="0"/>
               <a:t>Aire sous la courbe ROC</a:t>
             </a:r>
           </a:p>
           <a:p>
             <a:r>
-              <a:rPr lang="fr-FR" sz="2400" dirty="0"/>
-              <a:t>F-Score</a:t>
+              <a:rPr lang="fr-FR" dirty="0"/>
+              <a:t>Précision</a:t>
             </a:r>
+          </a:p>
+          <a:p>
+            <a:r>
+              <a:rPr lang="fr-FR" dirty="0" err="1"/>
+              <a:t>Recall</a:t>
+            </a:r>
+            <a:endParaRPr lang="fr-FR" dirty="0"/>
+          </a:p>
+          <a:p>
+            <a:r>
+              <a:rPr lang="fr-FR" dirty="0"/>
+              <a:t>F-score</a:t>
+            </a:r>
+          </a:p>
+          <a:p>
+            <a:endParaRPr lang="fr-FR" dirty="0"/>
+          </a:p>
+          <a:p>
+            <a:pPr marL="0" indent="0">
+              <a:buFont typeface="Wingdings 3" charset="2"/>
+              <a:buNone/>
+            </a:pPr>
+            <a:r>
+              <a:rPr lang="fr-FR" sz="1800" dirty="0"/>
+              <a:t>Modèles:</a:t>
+            </a:r>
+          </a:p>
+          <a:p>
+            <a:r>
+              <a:rPr lang="fr-FR" sz="1800" dirty="0"/>
+              <a:t>Régression logistique</a:t>
+            </a:r>
+          </a:p>
+          <a:p>
+            <a:r>
+              <a:rPr lang="fr-FR" sz="1800" dirty="0" err="1"/>
+              <a:t>Random</a:t>
+            </a:r>
+            <a:r>
+              <a:rPr lang="fr-FR" sz="1800" dirty="0"/>
+              <a:t> </a:t>
+            </a:r>
+            <a:r>
+              <a:rPr lang="fr-FR" sz="1800" dirty="0" err="1"/>
+              <a:t>forest</a:t>
+            </a:r>
+            <a:endParaRPr lang="fr-FR" sz="1800" dirty="0"/>
+          </a:p>
+          <a:p>
+            <a:r>
+              <a:rPr lang="fr-FR" sz="1800" dirty="0"/>
+              <a:t>SVM à noyau</a:t>
+            </a:r>
+          </a:p>
+          <a:p>
+            <a:r>
+              <a:rPr lang="fr-FR" sz="1800" dirty="0"/>
+              <a:t>Gradient </a:t>
+            </a:r>
+            <a:r>
+              <a:rPr lang="fr-FR" sz="1800" dirty="0" err="1"/>
+              <a:t>boosting</a:t>
+            </a:r>
+            <a:endParaRPr lang="fr-FR" sz="1800" dirty="0"/>
+          </a:p>
+          <a:p>
+            <a:pPr marL="0" indent="0">
+              <a:buNone/>
+            </a:pPr>
+            <a:endParaRPr lang="fr-FR" dirty="0"/>
           </a:p>
         </p:txBody>
       </p:sp>
@@ -15482,48 +15258,310 @@
               <a:buFont typeface="Wingdings 3" charset="2"/>
               <a:buNone/>
             </a:pPr>
+            <a:endParaRPr lang="fr-FR" sz="2400" dirty="0"/>
+          </a:p>
+        </p:txBody>
+      </p:sp>
+      <p:pic>
+        <p:nvPicPr>
+          <p:cNvPr id="5" name="Image 4">
+            <a:extLst>
+              <a:ext uri="{FF2B5EF4-FFF2-40B4-BE49-F238E27FC236}">
+                <a16:creationId xmlns:a16="http://schemas.microsoft.com/office/drawing/2014/main" id="{280B9DB8-75F1-40A5-8D11-B7BD9EE63388}"/>
+              </a:ext>
+            </a:extLst>
+          </p:cNvPr>
+          <p:cNvPicPr>
+            <a:picLocks noChangeAspect="1"/>
+          </p:cNvPicPr>
+          <p:nvPr/>
+        </p:nvPicPr>
+        <p:blipFill>
+          <a:blip r:embed="rId2"/>
+          <a:stretch>
+            <a:fillRect/>
+          </a:stretch>
+        </p:blipFill>
+        <p:spPr>
+          <a:xfrm>
+            <a:off x="7922350" y="2296933"/>
+            <a:ext cx="3238307" cy="4260103"/>
+          </a:xfrm>
+          <a:prstGeom prst="rect">
+            <a:avLst/>
+          </a:prstGeom>
+        </p:spPr>
+      </p:pic>
+      <p:sp>
+        <p:nvSpPr>
+          <p:cNvPr id="6" name="Espace réservé du contenu 2">
+            <a:extLst>
+              <a:ext uri="{FF2B5EF4-FFF2-40B4-BE49-F238E27FC236}">
+                <a16:creationId xmlns:a16="http://schemas.microsoft.com/office/drawing/2014/main" id="{848FF439-1C0F-4EBC-8C27-4C09B02B78D7}"/>
+              </a:ext>
+            </a:extLst>
+          </p:cNvPr>
+          <p:cNvSpPr txBox="1">
+            <a:spLocks/>
+          </p:cNvSpPr>
+          <p:nvPr/>
+        </p:nvSpPr>
+        <p:spPr>
+          <a:xfrm>
+            <a:off x="4917245" y="3922830"/>
+            <a:ext cx="2783592" cy="1510271"/>
+          </a:xfrm>
+          <a:prstGeom prst="rect">
+            <a:avLst/>
+          </a:prstGeom>
+        </p:spPr>
+        <p:txBody>
+          <a:bodyPr vert="horz" lIns="91440" tIns="45720" rIns="91440" bIns="45720" rtlCol="0">
+            <a:normAutofit/>
+          </a:bodyPr>
+          <a:lstStyle>
+            <a:lvl1pPr marL="342900" indent="-342900" algn="l" defTabSz="457200" rtl="0" eaLnBrk="1" latinLnBrk="0" hangingPunct="1">
+              <a:spcBef>
+                <a:spcPts val="1000"/>
+              </a:spcBef>
+              <a:spcAft>
+                <a:spcPts val="0"/>
+              </a:spcAft>
+              <a:buClr>
+                <a:schemeClr val="accent1"/>
+              </a:buClr>
+              <a:buSzPct val="80000"/>
+              <a:buFont typeface="Wingdings 3" charset="2"/>
+              <a:buChar char=""/>
+              <a:defRPr sz="1800" b="0" i="0" kern="1200">
+                <a:solidFill>
+                  <a:schemeClr val="tx1">
+                    <a:lumMod val="75000"/>
+                    <a:lumOff val="25000"/>
+                  </a:schemeClr>
+                </a:solidFill>
+                <a:latin typeface="+mn-lt"/>
+                <a:ea typeface="+mn-ea"/>
+                <a:cs typeface="+mn-cs"/>
+              </a:defRPr>
+            </a:lvl1pPr>
+            <a:lvl2pPr marL="742950" indent="-285750" algn="l" defTabSz="457200" rtl="0" eaLnBrk="1" latinLnBrk="0" hangingPunct="1">
+              <a:spcBef>
+                <a:spcPts val="1000"/>
+              </a:spcBef>
+              <a:spcAft>
+                <a:spcPts val="0"/>
+              </a:spcAft>
+              <a:buClr>
+                <a:schemeClr val="accent1"/>
+              </a:buClr>
+              <a:buSzPct val="80000"/>
+              <a:buFont typeface="Wingdings 3" charset="2"/>
+              <a:buChar char=""/>
+              <a:defRPr sz="1600" b="0" i="0" kern="1200">
+                <a:solidFill>
+                  <a:schemeClr val="tx1">
+                    <a:lumMod val="75000"/>
+                    <a:lumOff val="25000"/>
+                  </a:schemeClr>
+                </a:solidFill>
+                <a:latin typeface="+mn-lt"/>
+                <a:ea typeface="+mn-ea"/>
+                <a:cs typeface="+mn-cs"/>
+              </a:defRPr>
+            </a:lvl2pPr>
+            <a:lvl3pPr marL="1143000" indent="-228600" algn="l" defTabSz="457200" rtl="0" eaLnBrk="1" latinLnBrk="0" hangingPunct="1">
+              <a:spcBef>
+                <a:spcPts val="1000"/>
+              </a:spcBef>
+              <a:spcAft>
+                <a:spcPts val="0"/>
+              </a:spcAft>
+              <a:buClr>
+                <a:schemeClr val="accent1"/>
+              </a:buClr>
+              <a:buSzPct val="80000"/>
+              <a:buFont typeface="Wingdings 3" charset="2"/>
+              <a:buChar char=""/>
+              <a:defRPr sz="1400" b="0" i="0" kern="1200">
+                <a:solidFill>
+                  <a:schemeClr val="tx1">
+                    <a:lumMod val="75000"/>
+                    <a:lumOff val="25000"/>
+                  </a:schemeClr>
+                </a:solidFill>
+                <a:latin typeface="+mn-lt"/>
+                <a:ea typeface="+mn-ea"/>
+                <a:cs typeface="+mn-cs"/>
+              </a:defRPr>
+            </a:lvl3pPr>
+            <a:lvl4pPr marL="1600200" indent="-228600" algn="l" defTabSz="457200" rtl="0" eaLnBrk="1" latinLnBrk="0" hangingPunct="1">
+              <a:spcBef>
+                <a:spcPts val="1000"/>
+              </a:spcBef>
+              <a:spcAft>
+                <a:spcPts val="0"/>
+              </a:spcAft>
+              <a:buClr>
+                <a:schemeClr val="accent1"/>
+              </a:buClr>
+              <a:buSzPct val="80000"/>
+              <a:buFont typeface="Wingdings 3" charset="2"/>
+              <a:buChar char=""/>
+              <a:defRPr sz="1200" b="0" i="0" kern="1200">
+                <a:solidFill>
+                  <a:schemeClr val="tx1">
+                    <a:lumMod val="75000"/>
+                    <a:lumOff val="25000"/>
+                  </a:schemeClr>
+                </a:solidFill>
+                <a:latin typeface="+mn-lt"/>
+                <a:ea typeface="+mn-ea"/>
+                <a:cs typeface="+mn-cs"/>
+              </a:defRPr>
+            </a:lvl4pPr>
+            <a:lvl5pPr marL="2057400" indent="-228600" algn="l" defTabSz="457200" rtl="0" eaLnBrk="1" latinLnBrk="0" hangingPunct="1">
+              <a:spcBef>
+                <a:spcPts val="1000"/>
+              </a:spcBef>
+              <a:spcAft>
+                <a:spcPts val="0"/>
+              </a:spcAft>
+              <a:buClr>
+                <a:schemeClr val="accent1"/>
+              </a:buClr>
+              <a:buSzPct val="80000"/>
+              <a:buFont typeface="Wingdings 3" charset="2"/>
+              <a:buChar char=""/>
+              <a:defRPr sz="1200" b="0" i="0" kern="1200">
+                <a:solidFill>
+                  <a:schemeClr val="tx1">
+                    <a:lumMod val="75000"/>
+                    <a:lumOff val="25000"/>
+                  </a:schemeClr>
+                </a:solidFill>
+                <a:latin typeface="+mn-lt"/>
+                <a:ea typeface="+mn-ea"/>
+                <a:cs typeface="+mn-cs"/>
+              </a:defRPr>
+            </a:lvl5pPr>
+            <a:lvl6pPr marL="2514600" indent="-228600" algn="l" defTabSz="457200" rtl="0" eaLnBrk="1" latinLnBrk="0" hangingPunct="1">
+              <a:spcBef>
+                <a:spcPts val="1000"/>
+              </a:spcBef>
+              <a:spcAft>
+                <a:spcPts val="0"/>
+              </a:spcAft>
+              <a:buClr>
+                <a:schemeClr val="accent1"/>
+              </a:buClr>
+              <a:buSzPct val="80000"/>
+              <a:buFont typeface="Wingdings 3" charset="2"/>
+              <a:buChar char=""/>
+              <a:defRPr sz="1200" b="0" i="0" kern="1200">
+                <a:solidFill>
+                  <a:schemeClr val="tx1">
+                    <a:lumMod val="75000"/>
+                    <a:lumOff val="25000"/>
+                  </a:schemeClr>
+                </a:solidFill>
+                <a:latin typeface="+mn-lt"/>
+                <a:ea typeface="+mn-ea"/>
+                <a:cs typeface="+mn-cs"/>
+              </a:defRPr>
+            </a:lvl6pPr>
+            <a:lvl7pPr marL="2971800" indent="-228600" algn="l" defTabSz="457200" rtl="0" eaLnBrk="1" latinLnBrk="0" hangingPunct="1">
+              <a:spcBef>
+                <a:spcPts val="1000"/>
+              </a:spcBef>
+              <a:spcAft>
+                <a:spcPts val="0"/>
+              </a:spcAft>
+              <a:buClr>
+                <a:schemeClr val="accent1"/>
+              </a:buClr>
+              <a:buSzPct val="80000"/>
+              <a:buFont typeface="Wingdings 3" charset="2"/>
+              <a:buChar char=""/>
+              <a:defRPr sz="1200" b="0" i="0" kern="1200">
+                <a:solidFill>
+                  <a:schemeClr val="tx1">
+                    <a:lumMod val="75000"/>
+                    <a:lumOff val="25000"/>
+                  </a:schemeClr>
+                </a:solidFill>
+                <a:latin typeface="+mn-lt"/>
+                <a:ea typeface="+mn-ea"/>
+                <a:cs typeface="+mn-cs"/>
+              </a:defRPr>
+            </a:lvl7pPr>
+            <a:lvl8pPr marL="3429000" indent="-228600" algn="l" defTabSz="457200" rtl="0" eaLnBrk="1" latinLnBrk="0" hangingPunct="1">
+              <a:spcBef>
+                <a:spcPts val="1000"/>
+              </a:spcBef>
+              <a:spcAft>
+                <a:spcPts val="0"/>
+              </a:spcAft>
+              <a:buClr>
+                <a:schemeClr val="accent1"/>
+              </a:buClr>
+              <a:buSzPct val="80000"/>
+              <a:buFont typeface="Wingdings 3" charset="2"/>
+              <a:buChar char=""/>
+              <a:defRPr sz="1200" b="0" i="0" kern="1200">
+                <a:solidFill>
+                  <a:schemeClr val="tx1">
+                    <a:lumMod val="75000"/>
+                    <a:lumOff val="25000"/>
+                  </a:schemeClr>
+                </a:solidFill>
+                <a:latin typeface="+mn-lt"/>
+                <a:ea typeface="+mn-ea"/>
+                <a:cs typeface="+mn-cs"/>
+              </a:defRPr>
+            </a:lvl8pPr>
+            <a:lvl9pPr marL="3886200" indent="-228600" algn="l" defTabSz="457200" rtl="0" eaLnBrk="1" latinLnBrk="0" hangingPunct="1">
+              <a:spcBef>
+                <a:spcPts val="1000"/>
+              </a:spcBef>
+              <a:spcAft>
+                <a:spcPts val="0"/>
+              </a:spcAft>
+              <a:buClr>
+                <a:schemeClr val="accent1"/>
+              </a:buClr>
+              <a:buSzPct val="80000"/>
+              <a:buFont typeface="Wingdings 3" charset="2"/>
+              <a:buChar char=""/>
+              <a:defRPr sz="1200" b="0" i="0" kern="1200">
+                <a:solidFill>
+                  <a:schemeClr val="tx1">
+                    <a:lumMod val="75000"/>
+                    <a:lumOff val="25000"/>
+                  </a:schemeClr>
+                </a:solidFill>
+                <a:latin typeface="+mn-lt"/>
+                <a:ea typeface="+mn-ea"/>
+                <a:cs typeface="+mn-cs"/>
+              </a:defRPr>
+            </a:lvl9pPr>
+          </a:lstStyle>
+          <a:p>
+            <a:pPr marL="0" indent="0" algn="ctr">
+              <a:buFont typeface="Wingdings 3" charset="2"/>
+              <a:buNone/>
+            </a:pPr>
             <a:r>
-              <a:rPr lang="fr-FR" sz="2400" dirty="0"/>
-              <a:t>Modèles:</a:t>
+              <a:rPr lang="fr-FR" dirty="0"/>
+              <a:t>Balance de la variable cible (SMOTE):</a:t>
             </a:r>
           </a:p>
           <a:p>
-            <a:r>
-              <a:rPr lang="fr-FR" sz="2400" dirty="0"/>
-              <a:t>Régression logistique</a:t>
-            </a:r>
-          </a:p>
-          <a:p>
-            <a:r>
-              <a:rPr lang="fr-FR" sz="2400" dirty="0" err="1"/>
-              <a:t>Random</a:t>
-            </a:r>
-            <a:r>
-              <a:rPr lang="fr-FR" sz="2400" dirty="0"/>
-              <a:t> </a:t>
-            </a:r>
-            <a:r>
-              <a:rPr lang="fr-FR" sz="2400" dirty="0" err="1"/>
-              <a:t>forest</a:t>
-            </a:r>
-            <a:endParaRPr lang="fr-FR" sz="2400" dirty="0"/>
-          </a:p>
-          <a:p>
-            <a:r>
-              <a:rPr lang="fr-FR" sz="2400" dirty="0"/>
-              <a:t>SVM à noyau</a:t>
-            </a:r>
-          </a:p>
-          <a:p>
-            <a:r>
-              <a:rPr lang="fr-FR" sz="2400" dirty="0"/>
-              <a:t>Gradient </a:t>
-            </a:r>
-            <a:r>
-              <a:rPr lang="fr-FR" sz="2400" dirty="0" err="1"/>
-              <a:t>boosting</a:t>
-            </a:r>
-            <a:endParaRPr lang="fr-FR" sz="2400" dirty="0"/>
+            <a:pPr marL="0" indent="0" algn="ctr">
+              <a:buFont typeface="Wingdings 3" charset="2"/>
+              <a:buNone/>
+            </a:pPr>
+            <a:endParaRPr lang="fr-FR" dirty="0"/>
           </a:p>
         </p:txBody>
       </p:sp>

</xml_diff>

<commit_message>
computed notebook, added presentation
</commit_message>
<xml_diff>
--- a/P4_01_presentation.pptx
+++ b/P4_01_presentation.pptx
@@ -16,7 +16,9 @@
     <p:sldId id="264" r:id="rId10"/>
     <p:sldId id="265" r:id="rId11"/>
     <p:sldId id="266" r:id="rId12"/>
-    <p:sldId id="267" r:id="rId13"/>
+    <p:sldId id="268" r:id="rId13"/>
+    <p:sldId id="269" r:id="rId14"/>
+    <p:sldId id="270" r:id="rId15"/>
   </p:sldIdLst>
   <p:sldSz cx="12192000" cy="6858000"/>
   <p:notesSz cx="6858000" cy="9144000"/>
@@ -13327,10 +13329,10 @@
       </p:sp>
       <p:sp>
         <p:nvSpPr>
-          <p:cNvPr id="3" name="Espace réservé du contenu 2">
+          <p:cNvPr id="5" name="Espace réservé du contenu 4">
             <a:extLst>
               <a:ext uri="{FF2B5EF4-FFF2-40B4-BE49-F238E27FC236}">
-                <a16:creationId xmlns:a16="http://schemas.microsoft.com/office/drawing/2014/main" id="{8EA8D6C5-29C9-4534-81E6-9E476458725E}"/>
+                <a16:creationId xmlns:a16="http://schemas.microsoft.com/office/drawing/2014/main" id="{747C0A21-6E3C-4924-BEE6-42DC173097A2}"/>
               </a:ext>
             </a:extLst>
           </p:cNvPr>
@@ -13341,18 +13343,83 @@
             <p:ph idx="1"/>
           </p:nvPr>
         </p:nvSpPr>
-        <p:spPr/>
+        <p:spPr>
+          <a:xfrm>
+            <a:off x="756024" y="2213535"/>
+            <a:ext cx="8825659" cy="3416300"/>
+          </a:xfrm>
+        </p:spPr>
         <p:txBody>
           <a:bodyPr/>
           <a:lstStyle/>
           <a:p>
             <a:r>
               <a:rPr lang="fr-FR" dirty="0"/>
-              <a:t>Avec les variables additionnelles </a:t>
+              <a:t>Distribution des prédictions</a:t>
             </a:r>
           </a:p>
         </p:txBody>
       </p:sp>
+      <p:pic>
+        <p:nvPicPr>
+          <p:cNvPr id="7" name="Image 6">
+            <a:extLst>
+              <a:ext uri="{FF2B5EF4-FFF2-40B4-BE49-F238E27FC236}">
+                <a16:creationId xmlns:a16="http://schemas.microsoft.com/office/drawing/2014/main" id="{AAF03FE6-E7BE-4AD2-AF06-3F4C8B059D58}"/>
+              </a:ext>
+            </a:extLst>
+          </p:cNvPr>
+          <p:cNvPicPr>
+            <a:picLocks noChangeAspect="1"/>
+          </p:cNvPicPr>
+          <p:nvPr/>
+        </p:nvPicPr>
+        <p:blipFill>
+          <a:blip r:embed="rId2"/>
+          <a:stretch>
+            <a:fillRect/>
+          </a:stretch>
+        </p:blipFill>
+        <p:spPr>
+          <a:xfrm>
+            <a:off x="2837609" y="2729005"/>
+            <a:ext cx="2805033" cy="3768165"/>
+          </a:xfrm>
+          <a:prstGeom prst="rect">
+            <a:avLst/>
+          </a:prstGeom>
+        </p:spPr>
+      </p:pic>
+      <p:pic>
+        <p:nvPicPr>
+          <p:cNvPr id="9" name="Image 8">
+            <a:extLst>
+              <a:ext uri="{FF2B5EF4-FFF2-40B4-BE49-F238E27FC236}">
+                <a16:creationId xmlns:a16="http://schemas.microsoft.com/office/drawing/2014/main" id="{ADFDE3EC-A707-46F7-A8F6-533BCDD40234}"/>
+              </a:ext>
+            </a:extLst>
+          </p:cNvPr>
+          <p:cNvPicPr>
+            <a:picLocks noChangeAspect="1"/>
+          </p:cNvPicPr>
+          <p:nvPr/>
+        </p:nvPicPr>
+        <p:blipFill>
+          <a:blip r:embed="rId3"/>
+          <a:stretch>
+            <a:fillRect/>
+          </a:stretch>
+        </p:blipFill>
+        <p:spPr>
+          <a:xfrm>
+            <a:off x="5884970" y="2655439"/>
+            <a:ext cx="2868426" cy="3925215"/>
+          </a:xfrm>
+          <a:prstGeom prst="rect">
+            <a:avLst/>
+          </a:prstGeom>
+        </p:spPr>
+      </p:pic>
     </p:spTree>
     <p:extLst>
       <p:ext uri="{BB962C8B-B14F-4D97-AF65-F5344CB8AC3E}">
@@ -13406,7 +13473,7 @@
           <a:p>
             <a:r>
               <a:rPr lang="fr-FR" dirty="0"/>
-              <a:t>Interprétabilité du modèle</a:t>
+              <a:t>Interprétabilité du modèle: importance des variables</a:t>
             </a:r>
           </a:p>
         </p:txBody>
@@ -13427,15 +13494,83 @@
             <p:ph idx="1"/>
           </p:nvPr>
         </p:nvSpPr>
-        <p:spPr/>
+        <p:spPr>
+          <a:xfrm>
+            <a:off x="352613" y="3715123"/>
+            <a:ext cx="8825659" cy="3416300"/>
+          </a:xfrm>
+        </p:spPr>
         <p:txBody>
           <a:bodyPr/>
           <a:lstStyle/>
           <a:p>
-            <a:endParaRPr lang="fr-FR"/>
+            <a:r>
+              <a:rPr lang="fr-FR" dirty="0"/>
+              <a:t>Régression logistique</a:t>
+            </a:r>
           </a:p>
         </p:txBody>
       </p:sp>
+      <p:pic>
+        <p:nvPicPr>
+          <p:cNvPr id="5" name="Image 4">
+            <a:extLst>
+              <a:ext uri="{FF2B5EF4-FFF2-40B4-BE49-F238E27FC236}">
+                <a16:creationId xmlns:a16="http://schemas.microsoft.com/office/drawing/2014/main" id="{51C82790-A921-46B6-96D3-8C62362AACAE}"/>
+              </a:ext>
+            </a:extLst>
+          </p:cNvPr>
+          <p:cNvPicPr>
+            <a:picLocks noChangeAspect="1"/>
+          </p:cNvPicPr>
+          <p:nvPr/>
+        </p:nvPicPr>
+        <p:blipFill>
+          <a:blip r:embed="rId2"/>
+          <a:stretch>
+            <a:fillRect/>
+          </a:stretch>
+        </p:blipFill>
+        <p:spPr>
+          <a:xfrm>
+            <a:off x="3414712" y="2335306"/>
+            <a:ext cx="3412341" cy="4123484"/>
+          </a:xfrm>
+          <a:prstGeom prst="rect">
+            <a:avLst/>
+          </a:prstGeom>
+        </p:spPr>
+      </p:pic>
+      <p:pic>
+        <p:nvPicPr>
+          <p:cNvPr id="7" name="Image 6">
+            <a:extLst>
+              <a:ext uri="{FF2B5EF4-FFF2-40B4-BE49-F238E27FC236}">
+                <a16:creationId xmlns:a16="http://schemas.microsoft.com/office/drawing/2014/main" id="{C51F7AC8-7816-4017-9B0A-8A83638C0444}"/>
+              </a:ext>
+            </a:extLst>
+          </p:cNvPr>
+          <p:cNvPicPr>
+            <a:picLocks noChangeAspect="1"/>
+          </p:cNvPicPr>
+          <p:nvPr/>
+        </p:nvPicPr>
+        <p:blipFill>
+          <a:blip r:embed="rId3"/>
+          <a:stretch>
+            <a:fillRect/>
+          </a:stretch>
+        </p:blipFill>
+        <p:spPr>
+          <a:xfrm>
+            <a:off x="7250354" y="2335306"/>
+            <a:ext cx="3605905" cy="4202066"/>
+          </a:xfrm>
+          <a:prstGeom prst="rect">
+            <a:avLst/>
+          </a:prstGeom>
+        </p:spPr>
+      </p:pic>
     </p:spTree>
     <p:extLst>
       <p:ext uri="{BB962C8B-B14F-4D97-AF65-F5344CB8AC3E}">
@@ -13471,7 +13606,7 @@
           <p:cNvPr id="2" name="Titre 1">
             <a:extLst>
               <a:ext uri="{FF2B5EF4-FFF2-40B4-BE49-F238E27FC236}">
-                <a16:creationId xmlns:a16="http://schemas.microsoft.com/office/drawing/2014/main" id="{627F21BE-36C0-44DC-B930-964171BFFE21}"/>
+                <a16:creationId xmlns:a16="http://schemas.microsoft.com/office/drawing/2014/main" id="{54489D67-859A-41C4-8276-D3A3961476D0}"/>
               </a:ext>
             </a:extLst>
           </p:cNvPr>
@@ -13489,7 +13624,7 @@
           <a:p>
             <a:r>
               <a:rPr lang="fr-FR" dirty="0"/>
-              <a:t>Conclusion</a:t>
+              <a:t>Interprétabilité du modèle: importance des variables</a:t>
             </a:r>
           </a:p>
         </p:txBody>
@@ -13499,7 +13634,7 @@
           <p:cNvPr id="3" name="Espace réservé du contenu 2">
             <a:extLst>
               <a:ext uri="{FF2B5EF4-FFF2-40B4-BE49-F238E27FC236}">
-                <a16:creationId xmlns:a16="http://schemas.microsoft.com/office/drawing/2014/main" id="{C2A71EB0-93AE-484B-905C-11A78CDBE098}"/>
+                <a16:creationId xmlns:a16="http://schemas.microsoft.com/office/drawing/2014/main" id="{DCC91B17-75DC-4E04-BE5A-5ACB541576E5}"/>
               </a:ext>
             </a:extLst>
           </p:cNvPr>
@@ -13510,19 +13645,342 @@
             <p:ph idx="1"/>
           </p:nvPr>
         </p:nvSpPr>
+        <p:spPr>
+          <a:xfrm>
+            <a:off x="814295" y="2298700"/>
+            <a:ext cx="8825659" cy="3416300"/>
+          </a:xfrm>
+        </p:spPr>
+        <p:txBody>
+          <a:bodyPr/>
+          <a:lstStyle/>
+          <a:p>
+            <a:r>
+              <a:rPr lang="fr-FR" dirty="0" err="1"/>
+              <a:t>Random</a:t>
+            </a:r>
+            <a:r>
+              <a:rPr lang="fr-FR" dirty="0"/>
+              <a:t> Forest</a:t>
+            </a:r>
+          </a:p>
+        </p:txBody>
+      </p:sp>
+      <p:pic>
+        <p:nvPicPr>
+          <p:cNvPr id="5" name="Image 4">
+            <a:extLst>
+              <a:ext uri="{FF2B5EF4-FFF2-40B4-BE49-F238E27FC236}">
+                <a16:creationId xmlns:a16="http://schemas.microsoft.com/office/drawing/2014/main" id="{D4AD92AE-970A-4487-BC55-CCB589E7196F}"/>
+              </a:ext>
+            </a:extLst>
+          </p:cNvPr>
+          <p:cNvPicPr>
+            <a:picLocks noChangeAspect="1"/>
+          </p:cNvPicPr>
+          <p:nvPr/>
+        </p:nvPicPr>
+        <p:blipFill>
+          <a:blip r:embed="rId2"/>
+          <a:stretch>
+            <a:fillRect/>
+          </a:stretch>
+        </p:blipFill>
+        <p:spPr>
+          <a:xfrm>
+            <a:off x="1959349" y="2664447"/>
+            <a:ext cx="3375772" cy="4079534"/>
+          </a:xfrm>
+          <a:prstGeom prst="rect">
+            <a:avLst/>
+          </a:prstGeom>
+        </p:spPr>
+      </p:pic>
+      <p:pic>
+        <p:nvPicPr>
+          <p:cNvPr id="7" name="Image 6">
+            <a:extLst>
+              <a:ext uri="{FF2B5EF4-FFF2-40B4-BE49-F238E27FC236}">
+                <a16:creationId xmlns:a16="http://schemas.microsoft.com/office/drawing/2014/main" id="{D6BA4282-3B60-4DF5-8C21-963874BFD7DF}"/>
+              </a:ext>
+            </a:extLst>
+          </p:cNvPr>
+          <p:cNvPicPr>
+            <a:picLocks noChangeAspect="1"/>
+          </p:cNvPicPr>
+          <p:nvPr/>
+        </p:nvPicPr>
+        <p:blipFill>
+          <a:blip r:embed="rId3"/>
+          <a:stretch>
+            <a:fillRect/>
+          </a:stretch>
+        </p:blipFill>
+        <p:spPr>
+          <a:xfrm>
+            <a:off x="6196946" y="2469111"/>
+            <a:ext cx="3375772" cy="4205114"/>
+          </a:xfrm>
+          <a:prstGeom prst="rect">
+            <a:avLst/>
+          </a:prstGeom>
+        </p:spPr>
+      </p:pic>
+    </p:spTree>
+    <p:extLst>
+      <p:ext uri="{BB962C8B-B14F-4D97-AF65-F5344CB8AC3E}">
+        <p14:creationId xmlns:p14="http://schemas.microsoft.com/office/powerpoint/2010/main" val="1184187487"/>
+      </p:ext>
+    </p:extLst>
+  </p:cSld>
+  <p:clrMapOvr>
+    <a:masterClrMapping/>
+  </p:clrMapOvr>
+</p:sld>
+</file>
+
+<file path=ppt/slides/slide13.xml><?xml version="1.0" encoding="utf-8"?>
+<p:sld xmlns:a="http://schemas.openxmlformats.org/drawingml/2006/main" xmlns:r="http://schemas.openxmlformats.org/officeDocument/2006/relationships" xmlns:p="http://schemas.openxmlformats.org/presentationml/2006/main">
+  <p:cSld>
+    <p:spTree>
+      <p:nvGrpSpPr>
+        <p:cNvPr id="1" name=""/>
+        <p:cNvGrpSpPr/>
+        <p:nvPr/>
+      </p:nvGrpSpPr>
+      <p:grpSpPr>
+        <a:xfrm>
+          <a:off x="0" y="0"/>
+          <a:ext cx="0" cy="0"/>
+          <a:chOff x="0" y="0"/>
+          <a:chExt cx="0" cy="0"/>
+        </a:xfrm>
+      </p:grpSpPr>
+      <p:sp>
+        <p:nvSpPr>
+          <p:cNvPr id="2" name="Titre 1">
+            <a:extLst>
+              <a:ext uri="{FF2B5EF4-FFF2-40B4-BE49-F238E27FC236}">
+                <a16:creationId xmlns:a16="http://schemas.microsoft.com/office/drawing/2014/main" id="{54489D67-859A-41C4-8276-D3A3961476D0}"/>
+              </a:ext>
+            </a:extLst>
+          </p:cNvPr>
+          <p:cNvSpPr>
+            <a:spLocks noGrp="1"/>
+          </p:cNvSpPr>
+          <p:nvPr>
+            <p:ph type="title"/>
+          </p:nvPr>
+        </p:nvSpPr>
         <p:spPr/>
         <p:txBody>
           <a:bodyPr/>
           <a:lstStyle/>
           <a:p>
-            <a:endParaRPr lang="fr-FR"/>
+            <a:r>
+              <a:rPr lang="fr-FR" dirty="0"/>
+              <a:t>Interprétabilité du modèle: importance des variables</a:t>
+            </a:r>
+          </a:p>
+        </p:txBody>
+      </p:sp>
+      <p:sp>
+        <p:nvSpPr>
+          <p:cNvPr id="3" name="Espace réservé du contenu 2">
+            <a:extLst>
+              <a:ext uri="{FF2B5EF4-FFF2-40B4-BE49-F238E27FC236}">
+                <a16:creationId xmlns:a16="http://schemas.microsoft.com/office/drawing/2014/main" id="{DCC91B17-75DC-4E04-BE5A-5ACB541576E5}"/>
+              </a:ext>
+            </a:extLst>
+          </p:cNvPr>
+          <p:cNvSpPr>
+            <a:spLocks noGrp="1"/>
+          </p:cNvSpPr>
+          <p:nvPr>
+            <p:ph idx="1"/>
+          </p:nvPr>
+        </p:nvSpPr>
+        <p:spPr>
+          <a:xfrm>
+            <a:off x="590177" y="2146300"/>
+            <a:ext cx="8825659" cy="3416300"/>
+          </a:xfrm>
+        </p:spPr>
+        <p:txBody>
+          <a:bodyPr/>
+          <a:lstStyle/>
+          <a:p>
+            <a:r>
+              <a:rPr lang="fr-FR" dirty="0"/>
+              <a:t>Light Gradient </a:t>
+            </a:r>
+            <a:r>
+              <a:rPr lang="fr-FR" dirty="0" err="1"/>
+              <a:t>Boosting</a:t>
+            </a:r>
+            <a:r>
+              <a:rPr lang="fr-FR" dirty="0"/>
+              <a:t> Machine</a:t>
+            </a:r>
+          </a:p>
+        </p:txBody>
+      </p:sp>
+      <p:pic>
+        <p:nvPicPr>
+          <p:cNvPr id="5" name="Image 4">
+            <a:extLst>
+              <a:ext uri="{FF2B5EF4-FFF2-40B4-BE49-F238E27FC236}">
+                <a16:creationId xmlns:a16="http://schemas.microsoft.com/office/drawing/2014/main" id="{96738FFF-EE9F-4338-A059-2DFCBCDEC972}"/>
+              </a:ext>
+            </a:extLst>
+          </p:cNvPr>
+          <p:cNvPicPr>
+            <a:picLocks noChangeAspect="1"/>
+          </p:cNvPicPr>
+          <p:nvPr/>
+        </p:nvPicPr>
+        <p:blipFill>
+          <a:blip r:embed="rId2"/>
+          <a:stretch>
+            <a:fillRect/>
+          </a:stretch>
+        </p:blipFill>
+        <p:spPr>
+          <a:xfrm>
+            <a:off x="1213037" y="2483224"/>
+            <a:ext cx="3660398" cy="4256554"/>
+          </a:xfrm>
+          <a:prstGeom prst="rect">
+            <a:avLst/>
+          </a:prstGeom>
+        </p:spPr>
+      </p:pic>
+      <p:pic>
+        <p:nvPicPr>
+          <p:cNvPr id="7" name="Image 6">
+            <a:extLst>
+              <a:ext uri="{FF2B5EF4-FFF2-40B4-BE49-F238E27FC236}">
+                <a16:creationId xmlns:a16="http://schemas.microsoft.com/office/drawing/2014/main" id="{FA478850-11FC-4F87-9FA4-1157579943FF}"/>
+              </a:ext>
+            </a:extLst>
+          </p:cNvPr>
+          <p:cNvPicPr>
+            <a:picLocks noChangeAspect="1"/>
+          </p:cNvPicPr>
+          <p:nvPr/>
+        </p:nvPicPr>
+        <p:blipFill>
+          <a:blip r:embed="rId3"/>
+          <a:stretch>
+            <a:fillRect/>
+          </a:stretch>
+        </p:blipFill>
+        <p:spPr>
+          <a:xfrm>
+            <a:off x="5535660" y="2483224"/>
+            <a:ext cx="3583840" cy="4256554"/>
+          </a:xfrm>
+          <a:prstGeom prst="rect">
+            <a:avLst/>
+          </a:prstGeom>
+        </p:spPr>
+      </p:pic>
+    </p:spTree>
+    <p:extLst>
+      <p:ext uri="{BB962C8B-B14F-4D97-AF65-F5344CB8AC3E}">
+        <p14:creationId xmlns:p14="http://schemas.microsoft.com/office/powerpoint/2010/main" val="3473180023"/>
+      </p:ext>
+    </p:extLst>
+  </p:cSld>
+  <p:clrMapOvr>
+    <a:masterClrMapping/>
+  </p:clrMapOvr>
+</p:sld>
+</file>
+
+<file path=ppt/slides/slide14.xml><?xml version="1.0" encoding="utf-8"?>
+<p:sld xmlns:a="http://schemas.openxmlformats.org/drawingml/2006/main" xmlns:r="http://schemas.openxmlformats.org/officeDocument/2006/relationships" xmlns:p="http://schemas.openxmlformats.org/presentationml/2006/main">
+  <p:cSld>
+    <p:spTree>
+      <p:nvGrpSpPr>
+        <p:cNvPr id="1" name=""/>
+        <p:cNvGrpSpPr/>
+        <p:nvPr/>
+      </p:nvGrpSpPr>
+      <p:grpSpPr>
+        <a:xfrm>
+          <a:off x="0" y="0"/>
+          <a:ext cx="0" cy="0"/>
+          <a:chOff x="0" y="0"/>
+          <a:chExt cx="0" cy="0"/>
+        </a:xfrm>
+      </p:grpSpPr>
+      <p:sp>
+        <p:nvSpPr>
+          <p:cNvPr id="2" name="Titre 1">
+            <a:extLst>
+              <a:ext uri="{FF2B5EF4-FFF2-40B4-BE49-F238E27FC236}">
+                <a16:creationId xmlns:a16="http://schemas.microsoft.com/office/drawing/2014/main" id="{61239734-3D86-4F2D-B255-154FFFCD9567}"/>
+              </a:ext>
+            </a:extLst>
+          </p:cNvPr>
+          <p:cNvSpPr>
+            <a:spLocks noGrp="1"/>
+          </p:cNvSpPr>
+          <p:nvPr>
+            <p:ph type="ctrTitle"/>
+          </p:nvPr>
+        </p:nvSpPr>
+        <p:spPr>
+          <a:xfrm>
+            <a:off x="2313829" y="1042208"/>
+            <a:ext cx="7017027" cy="2677648"/>
+          </a:xfrm>
+        </p:spPr>
+        <p:txBody>
+          <a:bodyPr/>
+          <a:lstStyle/>
+          <a:p>
+            <a:pPr algn="ctr"/>
+            <a:r>
+              <a:rPr lang="fr-FR" dirty="0"/>
+              <a:t>Conclusion</a:t>
+            </a:r>
+          </a:p>
+        </p:txBody>
+      </p:sp>
+      <p:sp>
+        <p:nvSpPr>
+          <p:cNvPr id="3" name="Sous-titre 2">
+            <a:extLst>
+              <a:ext uri="{FF2B5EF4-FFF2-40B4-BE49-F238E27FC236}">
+                <a16:creationId xmlns:a16="http://schemas.microsoft.com/office/drawing/2014/main" id="{40683B9D-5002-4D84-88EA-28E9DBEBE1D5}"/>
+              </a:ext>
+            </a:extLst>
+          </p:cNvPr>
+          <p:cNvSpPr>
+            <a:spLocks noGrp="1"/>
+          </p:cNvSpPr>
+          <p:nvPr>
+            <p:ph type="subTitle" idx="1"/>
+          </p:nvPr>
+        </p:nvSpPr>
+        <p:spPr/>
+        <p:txBody>
+          <a:bodyPr/>
+          <a:lstStyle/>
+          <a:p>
+            <a:r>
+              <a:rPr lang="fr-FR" dirty="0"/>
+              <a:t>Formation Ingénieur IA – Projet 4  </a:t>
+            </a:r>
           </a:p>
         </p:txBody>
       </p:sp>
     </p:spTree>
     <p:extLst>
       <p:ext uri="{BB962C8B-B14F-4D97-AF65-F5344CB8AC3E}">
-        <p14:creationId xmlns:p14="http://schemas.microsoft.com/office/powerpoint/2010/main" val="3372315250"/>
+        <p14:creationId xmlns:p14="http://schemas.microsoft.com/office/powerpoint/2010/main" val="3211125440"/>
       </p:ext>
     </p:extLst>
   </p:cSld>
@@ -14101,6 +14559,36 @@
           <a:chExt cx="0" cy="0"/>
         </a:xfrm>
       </p:grpSpPr>
+      <p:pic>
+        <p:nvPicPr>
+          <p:cNvPr id="9" name="Image 8">
+            <a:extLst>
+              <a:ext uri="{FF2B5EF4-FFF2-40B4-BE49-F238E27FC236}">
+                <a16:creationId xmlns:a16="http://schemas.microsoft.com/office/drawing/2014/main" id="{09FEE991-8D44-4F69-B24F-31FDC76188A7}"/>
+              </a:ext>
+            </a:extLst>
+          </p:cNvPr>
+          <p:cNvPicPr>
+            <a:picLocks noChangeAspect="1"/>
+          </p:cNvPicPr>
+          <p:nvPr/>
+        </p:nvPicPr>
+        <p:blipFill>
+          <a:blip r:embed="rId2"/>
+          <a:stretch>
+            <a:fillRect/>
+          </a:stretch>
+        </p:blipFill>
+        <p:spPr>
+          <a:xfrm>
+            <a:off x="5837974" y="2364917"/>
+            <a:ext cx="5065059" cy="4296146"/>
+          </a:xfrm>
+          <a:prstGeom prst="rect">
+            <a:avLst/>
+          </a:prstGeom>
+        </p:spPr>
+      </p:pic>
       <p:sp>
         <p:nvSpPr>
           <p:cNvPr id="2" name="Titre 1">
@@ -14151,7 +14639,7 @@
         </p:nvSpPr>
         <p:spPr>
           <a:xfrm>
-            <a:off x="630168" y="2353034"/>
+            <a:off x="628463" y="5996504"/>
             <a:ext cx="8825659" cy="3416300"/>
           </a:xfrm>
         </p:spPr>
@@ -14168,40 +14656,10 @@
       </p:sp>
       <p:pic>
         <p:nvPicPr>
-          <p:cNvPr id="5" name="Image 4">
+          <p:cNvPr id="6" name="Image 5">
             <a:extLst>
               <a:ext uri="{FF2B5EF4-FFF2-40B4-BE49-F238E27FC236}">
-                <a16:creationId xmlns:a16="http://schemas.microsoft.com/office/drawing/2014/main" id="{C3C60080-5C8D-47C2-B9B7-D8FD8C84AAB2}"/>
-              </a:ext>
-            </a:extLst>
-          </p:cNvPr>
-          <p:cNvPicPr>
-            <a:picLocks noChangeAspect="1"/>
-          </p:cNvPicPr>
-          <p:nvPr/>
-        </p:nvPicPr>
-        <p:blipFill>
-          <a:blip r:embed="rId2"/>
-          <a:stretch>
-            <a:fillRect/>
-          </a:stretch>
-        </p:blipFill>
-        <p:spPr>
-          <a:xfrm>
-            <a:off x="1275894" y="2875804"/>
-            <a:ext cx="3629025" cy="3905250"/>
-          </a:xfrm>
-          <a:prstGeom prst="rect">
-            <a:avLst/>
-          </a:prstGeom>
-        </p:spPr>
-      </p:pic>
-      <p:pic>
-        <p:nvPicPr>
-          <p:cNvPr id="7" name="Image 6">
-            <a:extLst>
-              <a:ext uri="{FF2B5EF4-FFF2-40B4-BE49-F238E27FC236}">
-                <a16:creationId xmlns:a16="http://schemas.microsoft.com/office/drawing/2014/main" id="{564C6D1F-04AD-4F84-AEBF-1ADEC1D3C5BD}"/>
+                <a16:creationId xmlns:a16="http://schemas.microsoft.com/office/drawing/2014/main" id="{D7F9AAFC-2DF4-420D-8405-A4CAF5BC21E4}"/>
               </a:ext>
             </a:extLst>
           </p:cNvPr>
@@ -14218,8 +14676,8 @@
         </p:blipFill>
         <p:spPr>
           <a:xfrm>
-            <a:off x="6096000" y="2859983"/>
-            <a:ext cx="4292379" cy="3637516"/>
+            <a:off x="1803082" y="2549945"/>
+            <a:ext cx="2906517" cy="3446559"/>
           </a:xfrm>
           <a:prstGeom prst="rect">
             <a:avLst/>
@@ -14306,7 +14764,7 @@
         </p:nvSpPr>
         <p:spPr>
           <a:xfrm>
-            <a:off x="976050" y="2925528"/>
+            <a:off x="1083626" y="2661069"/>
             <a:ext cx="2932016" cy="473655"/>
           </a:xfrm>
         </p:spPr>
@@ -14321,36 +14779,6 @@
           </a:p>
         </p:txBody>
       </p:sp>
-      <p:pic>
-        <p:nvPicPr>
-          <p:cNvPr id="5" name="Image 4">
-            <a:extLst>
-              <a:ext uri="{FF2B5EF4-FFF2-40B4-BE49-F238E27FC236}">
-                <a16:creationId xmlns:a16="http://schemas.microsoft.com/office/drawing/2014/main" id="{19EE57FF-1E81-43D2-8021-6C52BD731C68}"/>
-              </a:ext>
-            </a:extLst>
-          </p:cNvPr>
-          <p:cNvPicPr>
-            <a:picLocks noChangeAspect="1"/>
-          </p:cNvPicPr>
-          <p:nvPr/>
-        </p:nvPicPr>
-        <p:blipFill>
-          <a:blip r:embed="rId2"/>
-          <a:stretch>
-            <a:fillRect/>
-          </a:stretch>
-        </p:blipFill>
-        <p:spPr>
-          <a:xfrm>
-            <a:off x="828095" y="3572538"/>
-            <a:ext cx="3467100" cy="1390650"/>
-          </a:xfrm>
-          <a:prstGeom prst="rect">
-            <a:avLst/>
-          </a:prstGeom>
-        </p:spPr>
-      </p:pic>
       <p:sp>
         <p:nvSpPr>
           <p:cNvPr id="6" name="Espace réservé du contenu 2">
@@ -14367,7 +14795,7 @@
         </p:nvSpPr>
         <p:spPr>
           <a:xfrm>
-            <a:off x="6630837" y="2924972"/>
+            <a:off x="6940119" y="2736713"/>
             <a:ext cx="2932016" cy="473655"/>
           </a:xfrm>
           <a:prstGeom prst="rect">
@@ -14615,10 +15043,40 @@
       </p:sp>
       <p:pic>
         <p:nvPicPr>
-          <p:cNvPr id="8" name="Image 7">
+          <p:cNvPr id="7" name="Image 6">
             <a:extLst>
               <a:ext uri="{FF2B5EF4-FFF2-40B4-BE49-F238E27FC236}">
-                <a16:creationId xmlns:a16="http://schemas.microsoft.com/office/drawing/2014/main" id="{F4B0D258-B836-4AF1-BF52-2CD54D37CBC6}"/>
+                <a16:creationId xmlns:a16="http://schemas.microsoft.com/office/drawing/2014/main" id="{3427DBFC-79D9-4B65-98C3-29A1837CC88C}"/>
+              </a:ext>
+            </a:extLst>
+          </p:cNvPr>
+          <p:cNvPicPr>
+            <a:picLocks noChangeAspect="1"/>
+          </p:cNvPicPr>
+          <p:nvPr/>
+        </p:nvPicPr>
+        <p:blipFill>
+          <a:blip r:embed="rId2"/>
+          <a:stretch>
+            <a:fillRect/>
+          </a:stretch>
+        </p:blipFill>
+        <p:spPr>
+          <a:xfrm>
+            <a:off x="585722" y="3484004"/>
+            <a:ext cx="4000500" cy="1771650"/>
+          </a:xfrm>
+          <a:prstGeom prst="rect">
+            <a:avLst/>
+          </a:prstGeom>
+        </p:spPr>
+      </p:pic>
+      <p:pic>
+        <p:nvPicPr>
+          <p:cNvPr id="11" name="Image 10">
+            <a:extLst>
+              <a:ext uri="{FF2B5EF4-FFF2-40B4-BE49-F238E27FC236}">
+                <a16:creationId xmlns:a16="http://schemas.microsoft.com/office/drawing/2014/main" id="{2DB7196F-B13B-421A-AD6D-62FE0864930D}"/>
               </a:ext>
             </a:extLst>
           </p:cNvPr>
@@ -14635,8 +15093,8 @@
         </p:blipFill>
         <p:spPr>
           <a:xfrm>
-            <a:off x="4865287" y="3458820"/>
-            <a:ext cx="3145234" cy="2198534"/>
+            <a:off x="4995302" y="3484004"/>
+            <a:ext cx="3521211" cy="2336427"/>
           </a:xfrm>
           <a:prstGeom prst="rect">
             <a:avLst/>
@@ -14645,10 +15103,10 @@
       </p:pic>
       <p:pic>
         <p:nvPicPr>
-          <p:cNvPr id="10" name="Image 9">
+          <p:cNvPr id="13" name="Image 12">
             <a:extLst>
               <a:ext uri="{FF2B5EF4-FFF2-40B4-BE49-F238E27FC236}">
-                <a16:creationId xmlns:a16="http://schemas.microsoft.com/office/drawing/2014/main" id="{C172D309-F2FF-414A-B115-9B80BC8D23C7}"/>
+                <a16:creationId xmlns:a16="http://schemas.microsoft.com/office/drawing/2014/main" id="{226ECDCD-7F0A-45B1-93B2-A07E4D8EDE2D}"/>
               </a:ext>
             </a:extLst>
           </p:cNvPr>
@@ -14665,8 +15123,8 @@
         </p:blipFill>
         <p:spPr>
           <a:xfrm>
-            <a:off x="8096845" y="3458819"/>
-            <a:ext cx="3205490" cy="2246242"/>
+            <a:off x="8365447" y="3524742"/>
+            <a:ext cx="3524312" cy="2450236"/>
           </a:xfrm>
           <a:prstGeom prst="rect">
             <a:avLst/>
@@ -14816,6 +15274,36 @@
           </a:p>
         </p:txBody>
       </p:sp>
+      <p:pic>
+        <p:nvPicPr>
+          <p:cNvPr id="5" name="Image 4">
+            <a:extLst>
+              <a:ext uri="{FF2B5EF4-FFF2-40B4-BE49-F238E27FC236}">
+                <a16:creationId xmlns:a16="http://schemas.microsoft.com/office/drawing/2014/main" id="{183F3FAF-CCA8-4E99-9798-BEBD59D22DDD}"/>
+              </a:ext>
+            </a:extLst>
+          </p:cNvPr>
+          <p:cNvPicPr>
+            <a:picLocks noChangeAspect="1"/>
+          </p:cNvPicPr>
+          <p:nvPr/>
+        </p:nvPicPr>
+        <p:blipFill>
+          <a:blip r:embed="rId2"/>
+          <a:stretch>
+            <a:fillRect/>
+          </a:stretch>
+        </p:blipFill>
+        <p:spPr>
+          <a:xfrm>
+            <a:off x="7551924" y="2086153"/>
+            <a:ext cx="2268912" cy="4164768"/>
+          </a:xfrm>
+          <a:prstGeom prst="rect">
+            <a:avLst/>
+          </a:prstGeom>
+        </p:spPr>
+      </p:pic>
     </p:spTree>
     <p:extLst>
       <p:ext uri="{BB962C8B-B14F-4D97-AF65-F5344CB8AC3E}">
@@ -14897,7 +15385,7 @@
         </p:nvSpPr>
         <p:spPr>
           <a:xfrm>
-            <a:off x="1031343" y="1978218"/>
+            <a:off x="744472" y="2238195"/>
             <a:ext cx="3490323" cy="4691029"/>
           </a:xfrm>
         </p:spPr>
@@ -14916,18 +15404,21 @@
             </a:r>
           </a:p>
           <a:p>
+            <a:pPr lvl="1"/>
             <a:r>
               <a:rPr lang="fr-FR" dirty="0"/>
               <a:t>Aire sous la courbe ROC</a:t>
             </a:r>
           </a:p>
           <a:p>
+            <a:pPr lvl="1"/>
             <a:r>
               <a:rPr lang="fr-FR" dirty="0"/>
               <a:t>Précision</a:t>
             </a:r>
           </a:p>
           <a:p>
+            <a:pPr lvl="1"/>
             <a:r>
               <a:rPr lang="fr-FR" dirty="0" err="1"/>
               <a:t>Recall</a:t>
@@ -14935,6 +15426,7 @@
             <a:endParaRPr lang="fr-FR" dirty="0"/>
           </a:p>
           <a:p>
+            <a:pPr lvl="1"/>
             <a:r>
               <a:rPr lang="fr-FR" dirty="0"/>
               <a:t>F-score</a:t>
@@ -14954,42 +15446,46 @@
             </a:r>
           </a:p>
           <a:p>
+            <a:pPr lvl="1"/>
             <a:r>
-              <a:rPr lang="fr-FR" sz="1800" dirty="0"/>
+              <a:rPr lang="fr-FR" dirty="0"/>
               <a:t>Régression logistique</a:t>
             </a:r>
           </a:p>
           <a:p>
+            <a:pPr lvl="1"/>
             <a:r>
-              <a:rPr lang="fr-FR" sz="1800" dirty="0" err="1"/>
+              <a:rPr lang="fr-FR" dirty="0" err="1"/>
               <a:t>Random</a:t>
             </a:r>
             <a:r>
-              <a:rPr lang="fr-FR" sz="1800" dirty="0"/>
+              <a:rPr lang="fr-FR" dirty="0"/>
               <a:t> </a:t>
             </a:r>
             <a:r>
-              <a:rPr lang="fr-FR" sz="1800" dirty="0" err="1"/>
+              <a:rPr lang="fr-FR" dirty="0" err="1"/>
               <a:t>forest</a:t>
             </a:r>
-            <a:endParaRPr lang="fr-FR" sz="1800" dirty="0"/>
-          </a:p>
-          <a:p>
+            <a:endParaRPr lang="fr-FR" dirty="0"/>
+          </a:p>
+          <a:p>
+            <a:pPr lvl="1"/>
             <a:r>
-              <a:rPr lang="fr-FR" sz="1800" dirty="0"/>
+              <a:rPr lang="fr-FR" dirty="0"/>
               <a:t>SVM à noyau</a:t>
             </a:r>
           </a:p>
           <a:p>
+            <a:pPr lvl="1"/>
             <a:r>
-              <a:rPr lang="fr-FR" sz="1800" dirty="0"/>
+              <a:rPr lang="fr-FR" dirty="0"/>
               <a:t>Gradient </a:t>
             </a:r>
             <a:r>
-              <a:rPr lang="fr-FR" sz="1800" dirty="0" err="1"/>
+              <a:rPr lang="fr-FR" dirty="0" err="1"/>
               <a:t>boosting</a:t>
             </a:r>
-            <a:endParaRPr lang="fr-FR" sz="1800" dirty="0"/>
+            <a:endParaRPr lang="fr-FR" dirty="0"/>
           </a:p>
           <a:p>
             <a:pPr marL="0" indent="0">
@@ -15015,7 +15511,7 @@
         </p:nvSpPr>
         <p:spPr>
           <a:xfrm>
-            <a:off x="6598947" y="2733261"/>
+            <a:off x="6581018" y="2737744"/>
             <a:ext cx="5491011" cy="3018184"/>
           </a:xfrm>
           <a:prstGeom prst="rect">
@@ -15262,36 +15758,6 @@
           </a:p>
         </p:txBody>
       </p:sp>
-      <p:pic>
-        <p:nvPicPr>
-          <p:cNvPr id="5" name="Image 4">
-            <a:extLst>
-              <a:ext uri="{FF2B5EF4-FFF2-40B4-BE49-F238E27FC236}">
-                <a16:creationId xmlns:a16="http://schemas.microsoft.com/office/drawing/2014/main" id="{280B9DB8-75F1-40A5-8D11-B7BD9EE63388}"/>
-              </a:ext>
-            </a:extLst>
-          </p:cNvPr>
-          <p:cNvPicPr>
-            <a:picLocks noChangeAspect="1"/>
-          </p:cNvPicPr>
-          <p:nvPr/>
-        </p:nvPicPr>
-        <p:blipFill>
-          <a:blip r:embed="rId2"/>
-          <a:stretch>
-            <a:fillRect/>
-          </a:stretch>
-        </p:blipFill>
-        <p:spPr>
-          <a:xfrm>
-            <a:off x="7922350" y="2296933"/>
-            <a:ext cx="3238307" cy="4260103"/>
-          </a:xfrm>
-          <a:prstGeom prst="rect">
-            <a:avLst/>
-          </a:prstGeom>
-        </p:spPr>
-      </p:pic>
       <p:sp>
         <p:nvSpPr>
           <p:cNvPr id="6" name="Espace réservé du contenu 2">
@@ -15308,7 +15774,7 @@
         </p:nvSpPr>
         <p:spPr>
           <a:xfrm>
-            <a:off x="4917245" y="3922830"/>
+            <a:off x="8435892" y="2197125"/>
             <a:ext cx="2783592" cy="1510271"/>
           </a:xfrm>
           <a:prstGeom prst="rect">
@@ -15565,6 +16031,332 @@
           </a:p>
         </p:txBody>
       </p:sp>
+      <p:pic>
+        <p:nvPicPr>
+          <p:cNvPr id="8" name="Image 7">
+            <a:extLst>
+              <a:ext uri="{FF2B5EF4-FFF2-40B4-BE49-F238E27FC236}">
+                <a16:creationId xmlns:a16="http://schemas.microsoft.com/office/drawing/2014/main" id="{14510BD0-3DD0-40A5-93AB-ED9B4A77EF45}"/>
+              </a:ext>
+            </a:extLst>
+          </p:cNvPr>
+          <p:cNvPicPr>
+            <a:picLocks noChangeAspect="1"/>
+          </p:cNvPicPr>
+          <p:nvPr/>
+        </p:nvPicPr>
+        <p:blipFill>
+          <a:blip r:embed="rId2"/>
+          <a:stretch>
+            <a:fillRect/>
+          </a:stretch>
+        </p:blipFill>
+        <p:spPr>
+          <a:xfrm>
+            <a:off x="8193234" y="2856119"/>
+            <a:ext cx="2980610" cy="3852635"/>
+          </a:xfrm>
+          <a:prstGeom prst="rect">
+            <a:avLst/>
+          </a:prstGeom>
+        </p:spPr>
+      </p:pic>
+      <p:sp>
+        <p:nvSpPr>
+          <p:cNvPr id="9" name="Espace réservé du contenu 2">
+            <a:extLst>
+              <a:ext uri="{FF2B5EF4-FFF2-40B4-BE49-F238E27FC236}">
+                <a16:creationId xmlns:a16="http://schemas.microsoft.com/office/drawing/2014/main" id="{13980C00-A66C-4E4D-9EDE-CC3A7E0D17A8}"/>
+              </a:ext>
+            </a:extLst>
+          </p:cNvPr>
+          <p:cNvSpPr txBox="1">
+            <a:spLocks/>
+          </p:cNvSpPr>
+          <p:nvPr/>
+        </p:nvSpPr>
+        <p:spPr>
+          <a:xfrm>
+            <a:off x="4697873" y="2798489"/>
+            <a:ext cx="2783592" cy="1510271"/>
+          </a:xfrm>
+          <a:prstGeom prst="rect">
+            <a:avLst/>
+          </a:prstGeom>
+        </p:spPr>
+        <p:txBody>
+          <a:bodyPr vert="horz" lIns="91440" tIns="45720" rIns="91440" bIns="45720" rtlCol="0">
+            <a:normAutofit/>
+          </a:bodyPr>
+          <a:lstStyle>
+            <a:lvl1pPr marL="342900" indent="-342900" algn="l" defTabSz="457200" rtl="0" eaLnBrk="1" latinLnBrk="0" hangingPunct="1">
+              <a:spcBef>
+                <a:spcPts val="1000"/>
+              </a:spcBef>
+              <a:spcAft>
+                <a:spcPts val="0"/>
+              </a:spcAft>
+              <a:buClr>
+                <a:schemeClr val="accent1"/>
+              </a:buClr>
+              <a:buSzPct val="80000"/>
+              <a:buFont typeface="Wingdings 3" charset="2"/>
+              <a:buChar char=""/>
+              <a:defRPr sz="1800" b="0" i="0" kern="1200">
+                <a:solidFill>
+                  <a:schemeClr val="tx1">
+                    <a:lumMod val="75000"/>
+                    <a:lumOff val="25000"/>
+                  </a:schemeClr>
+                </a:solidFill>
+                <a:latin typeface="+mn-lt"/>
+                <a:ea typeface="+mn-ea"/>
+                <a:cs typeface="+mn-cs"/>
+              </a:defRPr>
+            </a:lvl1pPr>
+            <a:lvl2pPr marL="742950" indent="-285750" algn="l" defTabSz="457200" rtl="0" eaLnBrk="1" latinLnBrk="0" hangingPunct="1">
+              <a:spcBef>
+                <a:spcPts val="1000"/>
+              </a:spcBef>
+              <a:spcAft>
+                <a:spcPts val="0"/>
+              </a:spcAft>
+              <a:buClr>
+                <a:schemeClr val="accent1"/>
+              </a:buClr>
+              <a:buSzPct val="80000"/>
+              <a:buFont typeface="Wingdings 3" charset="2"/>
+              <a:buChar char=""/>
+              <a:defRPr sz="1600" b="0" i="0" kern="1200">
+                <a:solidFill>
+                  <a:schemeClr val="tx1">
+                    <a:lumMod val="75000"/>
+                    <a:lumOff val="25000"/>
+                  </a:schemeClr>
+                </a:solidFill>
+                <a:latin typeface="+mn-lt"/>
+                <a:ea typeface="+mn-ea"/>
+                <a:cs typeface="+mn-cs"/>
+              </a:defRPr>
+            </a:lvl2pPr>
+            <a:lvl3pPr marL="1143000" indent="-228600" algn="l" defTabSz="457200" rtl="0" eaLnBrk="1" latinLnBrk="0" hangingPunct="1">
+              <a:spcBef>
+                <a:spcPts val="1000"/>
+              </a:spcBef>
+              <a:spcAft>
+                <a:spcPts val="0"/>
+              </a:spcAft>
+              <a:buClr>
+                <a:schemeClr val="accent1"/>
+              </a:buClr>
+              <a:buSzPct val="80000"/>
+              <a:buFont typeface="Wingdings 3" charset="2"/>
+              <a:buChar char=""/>
+              <a:defRPr sz="1400" b="0" i="0" kern="1200">
+                <a:solidFill>
+                  <a:schemeClr val="tx1">
+                    <a:lumMod val="75000"/>
+                    <a:lumOff val="25000"/>
+                  </a:schemeClr>
+                </a:solidFill>
+                <a:latin typeface="+mn-lt"/>
+                <a:ea typeface="+mn-ea"/>
+                <a:cs typeface="+mn-cs"/>
+              </a:defRPr>
+            </a:lvl3pPr>
+            <a:lvl4pPr marL="1600200" indent="-228600" algn="l" defTabSz="457200" rtl="0" eaLnBrk="1" latinLnBrk="0" hangingPunct="1">
+              <a:spcBef>
+                <a:spcPts val="1000"/>
+              </a:spcBef>
+              <a:spcAft>
+                <a:spcPts val="0"/>
+              </a:spcAft>
+              <a:buClr>
+                <a:schemeClr val="accent1"/>
+              </a:buClr>
+              <a:buSzPct val="80000"/>
+              <a:buFont typeface="Wingdings 3" charset="2"/>
+              <a:buChar char=""/>
+              <a:defRPr sz="1200" b="0" i="0" kern="1200">
+                <a:solidFill>
+                  <a:schemeClr val="tx1">
+                    <a:lumMod val="75000"/>
+                    <a:lumOff val="25000"/>
+                  </a:schemeClr>
+                </a:solidFill>
+                <a:latin typeface="+mn-lt"/>
+                <a:ea typeface="+mn-ea"/>
+                <a:cs typeface="+mn-cs"/>
+              </a:defRPr>
+            </a:lvl4pPr>
+            <a:lvl5pPr marL="2057400" indent="-228600" algn="l" defTabSz="457200" rtl="0" eaLnBrk="1" latinLnBrk="0" hangingPunct="1">
+              <a:spcBef>
+                <a:spcPts val="1000"/>
+              </a:spcBef>
+              <a:spcAft>
+                <a:spcPts val="0"/>
+              </a:spcAft>
+              <a:buClr>
+                <a:schemeClr val="accent1"/>
+              </a:buClr>
+              <a:buSzPct val="80000"/>
+              <a:buFont typeface="Wingdings 3" charset="2"/>
+              <a:buChar char=""/>
+              <a:defRPr sz="1200" b="0" i="0" kern="1200">
+                <a:solidFill>
+                  <a:schemeClr val="tx1">
+                    <a:lumMod val="75000"/>
+                    <a:lumOff val="25000"/>
+                  </a:schemeClr>
+                </a:solidFill>
+                <a:latin typeface="+mn-lt"/>
+                <a:ea typeface="+mn-ea"/>
+                <a:cs typeface="+mn-cs"/>
+              </a:defRPr>
+            </a:lvl5pPr>
+            <a:lvl6pPr marL="2514600" indent="-228600" algn="l" defTabSz="457200" rtl="0" eaLnBrk="1" latinLnBrk="0" hangingPunct="1">
+              <a:spcBef>
+                <a:spcPts val="1000"/>
+              </a:spcBef>
+              <a:spcAft>
+                <a:spcPts val="0"/>
+              </a:spcAft>
+              <a:buClr>
+                <a:schemeClr val="accent1"/>
+              </a:buClr>
+              <a:buSzPct val="80000"/>
+              <a:buFont typeface="Wingdings 3" charset="2"/>
+              <a:buChar char=""/>
+              <a:defRPr sz="1200" b="0" i="0" kern="1200">
+                <a:solidFill>
+                  <a:schemeClr val="tx1">
+                    <a:lumMod val="75000"/>
+                    <a:lumOff val="25000"/>
+                  </a:schemeClr>
+                </a:solidFill>
+                <a:latin typeface="+mn-lt"/>
+                <a:ea typeface="+mn-ea"/>
+                <a:cs typeface="+mn-cs"/>
+              </a:defRPr>
+            </a:lvl6pPr>
+            <a:lvl7pPr marL="2971800" indent="-228600" algn="l" defTabSz="457200" rtl="0" eaLnBrk="1" latinLnBrk="0" hangingPunct="1">
+              <a:spcBef>
+                <a:spcPts val="1000"/>
+              </a:spcBef>
+              <a:spcAft>
+                <a:spcPts val="0"/>
+              </a:spcAft>
+              <a:buClr>
+                <a:schemeClr val="accent1"/>
+              </a:buClr>
+              <a:buSzPct val="80000"/>
+              <a:buFont typeface="Wingdings 3" charset="2"/>
+              <a:buChar char=""/>
+              <a:defRPr sz="1200" b="0" i="0" kern="1200">
+                <a:solidFill>
+                  <a:schemeClr val="tx1">
+                    <a:lumMod val="75000"/>
+                    <a:lumOff val="25000"/>
+                  </a:schemeClr>
+                </a:solidFill>
+                <a:latin typeface="+mn-lt"/>
+                <a:ea typeface="+mn-ea"/>
+                <a:cs typeface="+mn-cs"/>
+              </a:defRPr>
+            </a:lvl7pPr>
+            <a:lvl8pPr marL="3429000" indent="-228600" algn="l" defTabSz="457200" rtl="0" eaLnBrk="1" latinLnBrk="0" hangingPunct="1">
+              <a:spcBef>
+                <a:spcPts val="1000"/>
+              </a:spcBef>
+              <a:spcAft>
+                <a:spcPts val="0"/>
+              </a:spcAft>
+              <a:buClr>
+                <a:schemeClr val="accent1"/>
+              </a:buClr>
+              <a:buSzPct val="80000"/>
+              <a:buFont typeface="Wingdings 3" charset="2"/>
+              <a:buChar char=""/>
+              <a:defRPr sz="1200" b="0" i="0" kern="1200">
+                <a:solidFill>
+                  <a:schemeClr val="tx1">
+                    <a:lumMod val="75000"/>
+                    <a:lumOff val="25000"/>
+                  </a:schemeClr>
+                </a:solidFill>
+                <a:latin typeface="+mn-lt"/>
+                <a:ea typeface="+mn-ea"/>
+                <a:cs typeface="+mn-cs"/>
+              </a:defRPr>
+            </a:lvl8pPr>
+            <a:lvl9pPr marL="3886200" indent="-228600" algn="l" defTabSz="457200" rtl="0" eaLnBrk="1" latinLnBrk="0" hangingPunct="1">
+              <a:spcBef>
+                <a:spcPts val="1000"/>
+              </a:spcBef>
+              <a:spcAft>
+                <a:spcPts val="0"/>
+              </a:spcAft>
+              <a:buClr>
+                <a:schemeClr val="accent1"/>
+              </a:buClr>
+              <a:buSzPct val="80000"/>
+              <a:buFont typeface="Wingdings 3" charset="2"/>
+              <a:buChar char=""/>
+              <a:defRPr sz="1200" b="0" i="0" kern="1200">
+                <a:solidFill>
+                  <a:schemeClr val="tx1">
+                    <a:lumMod val="75000"/>
+                    <a:lumOff val="25000"/>
+                  </a:schemeClr>
+                </a:solidFill>
+                <a:latin typeface="+mn-lt"/>
+                <a:ea typeface="+mn-ea"/>
+                <a:cs typeface="+mn-cs"/>
+              </a:defRPr>
+            </a:lvl9pPr>
+          </a:lstStyle>
+          <a:p>
+            <a:pPr marL="0" indent="0" algn="ctr">
+              <a:buFont typeface="Wingdings 3" charset="2"/>
+              <a:buNone/>
+            </a:pPr>
+            <a:r>
+              <a:rPr lang="fr-FR" dirty="0"/>
+              <a:t>Imputation et normalisation:</a:t>
+            </a:r>
+          </a:p>
+        </p:txBody>
+      </p:sp>
+      <p:pic>
+        <p:nvPicPr>
+          <p:cNvPr id="11" name="Image 10">
+            <a:extLst>
+              <a:ext uri="{FF2B5EF4-FFF2-40B4-BE49-F238E27FC236}">
+                <a16:creationId xmlns:a16="http://schemas.microsoft.com/office/drawing/2014/main" id="{85D704D4-7195-491B-82C1-618509454DD7}"/>
+              </a:ext>
+            </a:extLst>
+          </p:cNvPr>
+          <p:cNvPicPr>
+            <a:picLocks noChangeAspect="1"/>
+          </p:cNvPicPr>
+          <p:nvPr/>
+        </p:nvPicPr>
+        <p:blipFill>
+          <a:blip r:embed="rId3"/>
+          <a:stretch>
+            <a:fillRect/>
+          </a:stretch>
+        </p:blipFill>
+        <p:spPr>
+          <a:xfrm>
+            <a:off x="4441947" y="3429000"/>
+            <a:ext cx="3457575" cy="2028825"/>
+          </a:xfrm>
+          <a:prstGeom prst="rect">
+            <a:avLst/>
+          </a:prstGeom>
+        </p:spPr>
+      </p:pic>
     </p:spTree>
     <p:extLst>
       <p:ext uri="{BB962C8B-B14F-4D97-AF65-F5344CB8AC3E}">
@@ -15639,7 +16431,12 @@
             <p:ph idx="1"/>
           </p:nvPr>
         </p:nvSpPr>
-        <p:spPr/>
+        <p:spPr>
+          <a:xfrm>
+            <a:off x="699808" y="2191123"/>
+            <a:ext cx="8825659" cy="3416300"/>
+          </a:xfrm>
+        </p:spPr>
         <p:txBody>
           <a:bodyPr/>
           <a:lstStyle/>
@@ -15651,6 +16448,329 @@
           </a:p>
         </p:txBody>
       </p:sp>
+      <p:pic>
+        <p:nvPicPr>
+          <p:cNvPr id="5" name="Image 4">
+            <a:extLst>
+              <a:ext uri="{FF2B5EF4-FFF2-40B4-BE49-F238E27FC236}">
+                <a16:creationId xmlns:a16="http://schemas.microsoft.com/office/drawing/2014/main" id="{99CE0049-73FC-4A3C-A423-FC224617CEA4}"/>
+              </a:ext>
+            </a:extLst>
+          </p:cNvPr>
+          <p:cNvPicPr>
+            <a:picLocks noChangeAspect="1"/>
+          </p:cNvPicPr>
+          <p:nvPr/>
+        </p:nvPicPr>
+        <p:blipFill>
+          <a:blip r:embed="rId2"/>
+          <a:stretch>
+            <a:fillRect/>
+          </a:stretch>
+        </p:blipFill>
+        <p:spPr>
+          <a:xfrm>
+            <a:off x="699808" y="2687170"/>
+            <a:ext cx="5010150" cy="3543300"/>
+          </a:xfrm>
+          <a:prstGeom prst="rect">
+            <a:avLst/>
+          </a:prstGeom>
+        </p:spPr>
+      </p:pic>
+      <p:sp>
+        <p:nvSpPr>
+          <p:cNvPr id="6" name="Espace réservé du contenu 2">
+            <a:extLst>
+              <a:ext uri="{FF2B5EF4-FFF2-40B4-BE49-F238E27FC236}">
+                <a16:creationId xmlns:a16="http://schemas.microsoft.com/office/drawing/2014/main" id="{8E3E6B83-07F9-4951-B2C4-16C2E3733AFD}"/>
+              </a:ext>
+            </a:extLst>
+          </p:cNvPr>
+          <p:cNvSpPr txBox="1">
+            <a:spLocks/>
+          </p:cNvSpPr>
+          <p:nvPr/>
+        </p:nvSpPr>
+        <p:spPr>
+          <a:xfrm>
+            <a:off x="6341036" y="2191123"/>
+            <a:ext cx="8825659" cy="3416300"/>
+          </a:xfrm>
+          <a:prstGeom prst="rect">
+            <a:avLst/>
+          </a:prstGeom>
+        </p:spPr>
+        <p:txBody>
+          <a:bodyPr vert="horz" lIns="91440" tIns="45720" rIns="91440" bIns="45720" rtlCol="0">
+            <a:normAutofit/>
+          </a:bodyPr>
+          <a:lstStyle>
+            <a:lvl1pPr marL="342900" indent="-342900" algn="l" defTabSz="457200" rtl="0" eaLnBrk="1" latinLnBrk="0" hangingPunct="1">
+              <a:spcBef>
+                <a:spcPts val="1000"/>
+              </a:spcBef>
+              <a:spcAft>
+                <a:spcPts val="0"/>
+              </a:spcAft>
+              <a:buClr>
+                <a:schemeClr val="accent1"/>
+              </a:buClr>
+              <a:buSzPct val="80000"/>
+              <a:buFont typeface="Wingdings 3" charset="2"/>
+              <a:buChar char=""/>
+              <a:defRPr sz="1800" b="0" i="0" kern="1200">
+                <a:solidFill>
+                  <a:schemeClr val="tx1">
+                    <a:lumMod val="75000"/>
+                    <a:lumOff val="25000"/>
+                  </a:schemeClr>
+                </a:solidFill>
+                <a:latin typeface="+mn-lt"/>
+                <a:ea typeface="+mn-ea"/>
+                <a:cs typeface="+mn-cs"/>
+              </a:defRPr>
+            </a:lvl1pPr>
+            <a:lvl2pPr marL="742950" indent="-285750" algn="l" defTabSz="457200" rtl="0" eaLnBrk="1" latinLnBrk="0" hangingPunct="1">
+              <a:spcBef>
+                <a:spcPts val="1000"/>
+              </a:spcBef>
+              <a:spcAft>
+                <a:spcPts val="0"/>
+              </a:spcAft>
+              <a:buClr>
+                <a:schemeClr val="accent1"/>
+              </a:buClr>
+              <a:buSzPct val="80000"/>
+              <a:buFont typeface="Wingdings 3" charset="2"/>
+              <a:buChar char=""/>
+              <a:defRPr sz="1600" b="0" i="0" kern="1200">
+                <a:solidFill>
+                  <a:schemeClr val="tx1">
+                    <a:lumMod val="75000"/>
+                    <a:lumOff val="25000"/>
+                  </a:schemeClr>
+                </a:solidFill>
+                <a:latin typeface="+mn-lt"/>
+                <a:ea typeface="+mn-ea"/>
+                <a:cs typeface="+mn-cs"/>
+              </a:defRPr>
+            </a:lvl2pPr>
+            <a:lvl3pPr marL="1143000" indent="-228600" algn="l" defTabSz="457200" rtl="0" eaLnBrk="1" latinLnBrk="0" hangingPunct="1">
+              <a:spcBef>
+                <a:spcPts val="1000"/>
+              </a:spcBef>
+              <a:spcAft>
+                <a:spcPts val="0"/>
+              </a:spcAft>
+              <a:buClr>
+                <a:schemeClr val="accent1"/>
+              </a:buClr>
+              <a:buSzPct val="80000"/>
+              <a:buFont typeface="Wingdings 3" charset="2"/>
+              <a:buChar char=""/>
+              <a:defRPr sz="1400" b="0" i="0" kern="1200">
+                <a:solidFill>
+                  <a:schemeClr val="tx1">
+                    <a:lumMod val="75000"/>
+                    <a:lumOff val="25000"/>
+                  </a:schemeClr>
+                </a:solidFill>
+                <a:latin typeface="+mn-lt"/>
+                <a:ea typeface="+mn-ea"/>
+                <a:cs typeface="+mn-cs"/>
+              </a:defRPr>
+            </a:lvl3pPr>
+            <a:lvl4pPr marL="1600200" indent="-228600" algn="l" defTabSz="457200" rtl="0" eaLnBrk="1" latinLnBrk="0" hangingPunct="1">
+              <a:spcBef>
+                <a:spcPts val="1000"/>
+              </a:spcBef>
+              <a:spcAft>
+                <a:spcPts val="0"/>
+              </a:spcAft>
+              <a:buClr>
+                <a:schemeClr val="accent1"/>
+              </a:buClr>
+              <a:buSzPct val="80000"/>
+              <a:buFont typeface="Wingdings 3" charset="2"/>
+              <a:buChar char=""/>
+              <a:defRPr sz="1200" b="0" i="0" kern="1200">
+                <a:solidFill>
+                  <a:schemeClr val="tx1">
+                    <a:lumMod val="75000"/>
+                    <a:lumOff val="25000"/>
+                  </a:schemeClr>
+                </a:solidFill>
+                <a:latin typeface="+mn-lt"/>
+                <a:ea typeface="+mn-ea"/>
+                <a:cs typeface="+mn-cs"/>
+              </a:defRPr>
+            </a:lvl4pPr>
+            <a:lvl5pPr marL="2057400" indent="-228600" algn="l" defTabSz="457200" rtl="0" eaLnBrk="1" latinLnBrk="0" hangingPunct="1">
+              <a:spcBef>
+                <a:spcPts val="1000"/>
+              </a:spcBef>
+              <a:spcAft>
+                <a:spcPts val="0"/>
+              </a:spcAft>
+              <a:buClr>
+                <a:schemeClr val="accent1"/>
+              </a:buClr>
+              <a:buSzPct val="80000"/>
+              <a:buFont typeface="Wingdings 3" charset="2"/>
+              <a:buChar char=""/>
+              <a:defRPr sz="1200" b="0" i="0" kern="1200">
+                <a:solidFill>
+                  <a:schemeClr val="tx1">
+                    <a:lumMod val="75000"/>
+                    <a:lumOff val="25000"/>
+                  </a:schemeClr>
+                </a:solidFill>
+                <a:latin typeface="+mn-lt"/>
+                <a:ea typeface="+mn-ea"/>
+                <a:cs typeface="+mn-cs"/>
+              </a:defRPr>
+            </a:lvl5pPr>
+            <a:lvl6pPr marL="2514600" indent="-228600" algn="l" defTabSz="457200" rtl="0" eaLnBrk="1" latinLnBrk="0" hangingPunct="1">
+              <a:spcBef>
+                <a:spcPts val="1000"/>
+              </a:spcBef>
+              <a:spcAft>
+                <a:spcPts val="0"/>
+              </a:spcAft>
+              <a:buClr>
+                <a:schemeClr val="accent1"/>
+              </a:buClr>
+              <a:buSzPct val="80000"/>
+              <a:buFont typeface="Wingdings 3" charset="2"/>
+              <a:buChar char=""/>
+              <a:defRPr sz="1200" b="0" i="0" kern="1200">
+                <a:solidFill>
+                  <a:schemeClr val="tx1">
+                    <a:lumMod val="75000"/>
+                    <a:lumOff val="25000"/>
+                  </a:schemeClr>
+                </a:solidFill>
+                <a:latin typeface="+mn-lt"/>
+                <a:ea typeface="+mn-ea"/>
+                <a:cs typeface="+mn-cs"/>
+              </a:defRPr>
+            </a:lvl6pPr>
+            <a:lvl7pPr marL="2971800" indent="-228600" algn="l" defTabSz="457200" rtl="0" eaLnBrk="1" latinLnBrk="0" hangingPunct="1">
+              <a:spcBef>
+                <a:spcPts val="1000"/>
+              </a:spcBef>
+              <a:spcAft>
+                <a:spcPts val="0"/>
+              </a:spcAft>
+              <a:buClr>
+                <a:schemeClr val="accent1"/>
+              </a:buClr>
+              <a:buSzPct val="80000"/>
+              <a:buFont typeface="Wingdings 3" charset="2"/>
+              <a:buChar char=""/>
+              <a:defRPr sz="1200" b="0" i="0" kern="1200">
+                <a:solidFill>
+                  <a:schemeClr val="tx1">
+                    <a:lumMod val="75000"/>
+                    <a:lumOff val="25000"/>
+                  </a:schemeClr>
+                </a:solidFill>
+                <a:latin typeface="+mn-lt"/>
+                <a:ea typeface="+mn-ea"/>
+                <a:cs typeface="+mn-cs"/>
+              </a:defRPr>
+            </a:lvl7pPr>
+            <a:lvl8pPr marL="3429000" indent="-228600" algn="l" defTabSz="457200" rtl="0" eaLnBrk="1" latinLnBrk="0" hangingPunct="1">
+              <a:spcBef>
+                <a:spcPts val="1000"/>
+              </a:spcBef>
+              <a:spcAft>
+                <a:spcPts val="0"/>
+              </a:spcAft>
+              <a:buClr>
+                <a:schemeClr val="accent1"/>
+              </a:buClr>
+              <a:buSzPct val="80000"/>
+              <a:buFont typeface="Wingdings 3" charset="2"/>
+              <a:buChar char=""/>
+              <a:defRPr sz="1200" b="0" i="0" kern="1200">
+                <a:solidFill>
+                  <a:schemeClr val="tx1">
+                    <a:lumMod val="75000"/>
+                    <a:lumOff val="25000"/>
+                  </a:schemeClr>
+                </a:solidFill>
+                <a:latin typeface="+mn-lt"/>
+                <a:ea typeface="+mn-ea"/>
+                <a:cs typeface="+mn-cs"/>
+              </a:defRPr>
+            </a:lvl8pPr>
+            <a:lvl9pPr marL="3886200" indent="-228600" algn="l" defTabSz="457200" rtl="0" eaLnBrk="1" latinLnBrk="0" hangingPunct="1">
+              <a:spcBef>
+                <a:spcPts val="1000"/>
+              </a:spcBef>
+              <a:spcAft>
+                <a:spcPts val="0"/>
+              </a:spcAft>
+              <a:buClr>
+                <a:schemeClr val="accent1"/>
+              </a:buClr>
+              <a:buSzPct val="80000"/>
+              <a:buFont typeface="Wingdings 3" charset="2"/>
+              <a:buChar char=""/>
+              <a:defRPr sz="1200" b="0" i="0" kern="1200">
+                <a:solidFill>
+                  <a:schemeClr val="tx1">
+                    <a:lumMod val="75000"/>
+                    <a:lumOff val="25000"/>
+                  </a:schemeClr>
+                </a:solidFill>
+                <a:latin typeface="+mn-lt"/>
+                <a:ea typeface="+mn-ea"/>
+                <a:cs typeface="+mn-cs"/>
+              </a:defRPr>
+            </a:lvl9pPr>
+          </a:lstStyle>
+          <a:p>
+            <a:r>
+              <a:rPr lang="fr-FR"/>
+              <a:t>Avec les variables additionnelles </a:t>
+            </a:r>
+            <a:endParaRPr lang="fr-FR" dirty="0"/>
+          </a:p>
+        </p:txBody>
+      </p:sp>
+      <p:pic>
+        <p:nvPicPr>
+          <p:cNvPr id="8" name="Image 7">
+            <a:extLst>
+              <a:ext uri="{FF2B5EF4-FFF2-40B4-BE49-F238E27FC236}">
+                <a16:creationId xmlns:a16="http://schemas.microsoft.com/office/drawing/2014/main" id="{EEEC4931-B181-4259-8EA9-43ECB62E66F1}"/>
+              </a:ext>
+            </a:extLst>
+          </p:cNvPr>
+          <p:cNvPicPr>
+            <a:picLocks noChangeAspect="1"/>
+          </p:cNvPicPr>
+          <p:nvPr/>
+        </p:nvPicPr>
+        <p:blipFill>
+          <a:blip r:embed="rId3"/>
+          <a:stretch>
+            <a:fillRect/>
+          </a:stretch>
+        </p:blipFill>
+        <p:spPr>
+          <a:xfrm>
+            <a:off x="6181725" y="2622239"/>
+            <a:ext cx="5010150" cy="3495675"/>
+          </a:xfrm>
+          <a:prstGeom prst="rect">
+            <a:avLst/>
+          </a:prstGeom>
+        </p:spPr>
+      </p:pic>
     </p:spTree>
     <p:extLst>
       <p:ext uri="{BB962C8B-B14F-4D97-AF65-F5344CB8AC3E}">

</xml_diff>